<commit_message>
Updated ArgParseEpisode5.pptx with hyperlinks
</commit_message>
<xml_diff>
--- a/Sprint 5 Presentation/ArgParseEpisode5.pptx
+++ b/Sprint 5 Presentation/ArgParseEpisode5.pptx
@@ -5,7 +5,7 @@
     <p:sldMasterId id="2147483648" r:id="rId1"/>
   </p:sldMasterIdLst>
   <p:notesMasterIdLst>
-    <p:notesMasterId r:id="rId17"/>
+    <p:notesMasterId r:id="rId18"/>
   </p:notesMasterIdLst>
   <p:sldIdLst>
     <p:sldId id="256" r:id="rId2"/>
@@ -23,8 +23,9 @@
     <p:sldId id="269" r:id="rId14"/>
     <p:sldId id="270" r:id="rId15"/>
     <p:sldId id="271" r:id="rId16"/>
+    <p:sldId id="272" r:id="rId17"/>
   </p:sldIdLst>
-  <p:sldSz cx="9144000" cy="6858000" type="screen4x3"/>
+  <p:sldSz cx="9144000" cy="5143500" type="screen16x9"/>
   <p:notesSz cx="6858000" cy="9144000"/>
   <p:defaultTextStyle>
     <a:lvl1pPr marL="0" algn="l" rtl="0" latinLnBrk="0">
@@ -225,8 +226,8 @@
         </p:nvSpPr>
         <p:spPr>
           <a:xfrm>
-            <a:off x="1143000" y="685800"/>
-            <a:ext cx="4572000" cy="3429000"/>
+            <a:off x="381000" y="685800"/>
+            <a:ext cx="6096000" cy="3429000"/>
           </a:xfrm>
           <a:prstGeom prst="rect">
             <a:avLst/>
@@ -515,8 +516,8 @@
         </p:nvSpPr>
         <p:spPr>
           <a:xfrm>
-            <a:off x="1143000" y="685800"/>
-            <a:ext cx="4572000" cy="3429000"/>
+            <a:off x="381000" y="685800"/>
+            <a:ext cx="6096000" cy="3429000"/>
           </a:xfrm>
         </p:spPr>
       </p:sp>
@@ -605,8 +606,8 @@
         </p:nvSpPr>
         <p:spPr>
           <a:xfrm>
-            <a:off x="0" y="5971032"/>
-            <a:ext cx="9144000" cy="886968"/>
+            <a:off x="0" y="4478274"/>
+            <a:ext cx="9144000" cy="665226"/>
           </a:xfrm>
           <a:prstGeom prst="rect">
             <a:avLst/>
@@ -653,8 +654,8 @@
         </p:nvSpPr>
         <p:spPr>
           <a:xfrm>
-            <a:off x="-9144" y="6053328"/>
-            <a:ext cx="2249424" cy="713232"/>
+            <a:off x="-9144" y="4539996"/>
+            <a:ext cx="2249424" cy="534924"/>
           </a:xfrm>
           <a:prstGeom prst="rect">
             <a:avLst/>
@@ -703,8 +704,8 @@
         </p:nvSpPr>
         <p:spPr>
           <a:xfrm>
-            <a:off x="2359152" y="6044184"/>
-            <a:ext cx="6784848" cy="713232"/>
+            <a:off x="2359152" y="4533138"/>
+            <a:ext cx="6784848" cy="534924"/>
           </a:xfrm>
           <a:prstGeom prst="rect">
             <a:avLst/>
@@ -757,8 +758,8 @@
         </p:nvSpPr>
         <p:spPr>
           <a:xfrm>
-            <a:off x="2362200" y="6050037"/>
-            <a:ext cx="6515100" cy="685800"/>
+            <a:off x="2362200" y="4537528"/>
+            <a:ext cx="6515100" cy="514350"/>
           </a:xfrm>
         </p:spPr>
         <p:txBody>
@@ -819,8 +820,8 @@
         </p:nvSpPr>
         <p:spPr>
           <a:xfrm>
-            <a:off x="76200" y="6068699"/>
-            <a:ext cx="2057400" cy="685800"/>
+            <a:off x="76200" y="4551524"/>
+            <a:ext cx="2057400" cy="514350"/>
           </a:xfrm>
         </p:spPr>
         <p:txBody>
@@ -868,8 +869,8 @@
         </p:nvSpPr>
         <p:spPr>
           <a:xfrm>
-            <a:off x="2085393" y="236539"/>
-            <a:ext cx="5867400" cy="365125"/>
+            <a:off x="2085393" y="177405"/>
+            <a:ext cx="5867400" cy="273844"/>
           </a:xfrm>
         </p:spPr>
         <p:txBody>
@@ -906,8 +907,8 @@
         </p:nvSpPr>
         <p:spPr>
           <a:xfrm>
-            <a:off x="8001000" y="228600"/>
-            <a:ext cx="838200" cy="381000"/>
+            <a:off x="8001000" y="171450"/>
+            <a:ext cx="838200" cy="285750"/>
           </a:xfrm>
         </p:spPr>
         <p:txBody>
@@ -952,8 +953,8 @@
         </p:nvSpPr>
         <p:spPr>
           <a:xfrm>
-            <a:off x="2362200" y="3124200"/>
-            <a:ext cx="6477000" cy="2717800"/>
+            <a:off x="2362200" y="2343150"/>
+            <a:ext cx="6477000" cy="2038350"/>
           </a:xfrm>
         </p:spPr>
         <p:txBody>
@@ -1113,8 +1114,8 @@
         </p:nvSpPr>
         <p:spPr>
           <a:xfrm>
-            <a:off x="609600" y="1803400"/>
-            <a:ext cx="8153400" cy="4368800"/>
+            <a:off x="609600" y="1352550"/>
+            <a:ext cx="8153400" cy="3276600"/>
           </a:xfrm>
         </p:spPr>
         <p:txBody>
@@ -1202,8 +1203,8 @@
         </p:nvSpPr>
         <p:spPr>
           <a:xfrm>
-            <a:off x="1371601" y="2743201"/>
-            <a:ext cx="7123113" cy="1673225"/>
+            <a:off x="1371602" y="2057401"/>
+            <a:ext cx="7123113" cy="1254919"/>
           </a:xfrm>
         </p:spPr>
         <p:txBody>
@@ -1276,8 +1277,8 @@
         </p:nvSpPr>
         <p:spPr>
           <a:xfrm>
-            <a:off x="0" y="1524000"/>
-            <a:ext cx="9144000" cy="1143000"/>
+            <a:off x="0" y="1143000"/>
+            <a:ext cx="9144000" cy="857250"/>
           </a:xfrm>
           <a:prstGeom prst="rect">
             <a:avLst/>
@@ -1324,8 +1325,8 @@
         </p:nvSpPr>
         <p:spPr>
           <a:xfrm>
-            <a:off x="0" y="1600200"/>
-            <a:ext cx="1295400" cy="990600"/>
+            <a:off x="0" y="1200150"/>
+            <a:ext cx="1295400" cy="742950"/>
           </a:xfrm>
           <a:prstGeom prst="rect">
             <a:avLst/>
@@ -1374,8 +1375,8 @@
         </p:nvSpPr>
         <p:spPr>
           <a:xfrm>
-            <a:off x="1371600" y="1600200"/>
-            <a:ext cx="7772400" cy="990600"/>
+            <a:off x="1371600" y="1200150"/>
+            <a:ext cx="7772400" cy="742950"/>
           </a:xfrm>
           <a:prstGeom prst="rect">
             <a:avLst/>
@@ -1428,8 +1429,8 @@
         </p:nvSpPr>
         <p:spPr>
           <a:xfrm>
-            <a:off x="1371600" y="1600200"/>
-            <a:ext cx="7620000" cy="990600"/>
+            <a:off x="1371600" y="1200150"/>
+            <a:ext cx="7620000" cy="742950"/>
           </a:xfrm>
         </p:spPr>
         <p:txBody>
@@ -1492,8 +1493,8 @@
         </p:nvSpPr>
         <p:spPr>
           <a:xfrm>
-            <a:off x="0" y="1752601"/>
-            <a:ext cx="1295400" cy="701676"/>
+            <a:off x="0" y="1314451"/>
+            <a:ext cx="1295400" cy="526257"/>
           </a:xfrm>
         </p:spPr>
         <p:txBody>
@@ -1612,8 +1613,8 @@
         </p:nvSpPr>
         <p:spPr>
           <a:xfrm>
-            <a:off x="609600" y="1803402"/>
-            <a:ext cx="3886200" cy="4358165"/>
+            <a:off x="609600" y="1352552"/>
+            <a:ext cx="3886200" cy="3268624"/>
           </a:xfrm>
         </p:spPr>
         <p:txBody>
@@ -1671,8 +1672,8 @@
         </p:nvSpPr>
         <p:spPr>
           <a:xfrm>
-            <a:off x="4844901" y="1803399"/>
-            <a:ext cx="3886200" cy="4358167"/>
+            <a:off x="4844901" y="1352550"/>
+            <a:ext cx="3886200" cy="3268625"/>
           </a:xfrm>
         </p:spPr>
         <p:txBody>
@@ -1833,8 +1834,8 @@
         </p:nvSpPr>
         <p:spPr>
           <a:xfrm>
-            <a:off x="612648" y="157480"/>
-            <a:ext cx="8153400" cy="1341120"/>
+            <a:off x="612648" y="118110"/>
+            <a:ext cx="8153400" cy="1005840"/>
           </a:xfrm>
         </p:spPr>
         <p:txBody>
@@ -1866,8 +1867,8 @@
         </p:nvSpPr>
         <p:spPr>
           <a:xfrm>
-            <a:off x="609600" y="2559757"/>
-            <a:ext cx="3886200" cy="3505200"/>
+            <a:off x="609600" y="1919818"/>
+            <a:ext cx="3886200" cy="2628900"/>
           </a:xfrm>
         </p:spPr>
         <p:txBody>
@@ -1925,8 +1926,8 @@
         </p:nvSpPr>
         <p:spPr>
           <a:xfrm>
-            <a:off x="4800600" y="2559757"/>
-            <a:ext cx="3886200" cy="3505200"/>
+            <a:off x="4800600" y="1919818"/>
+            <a:ext cx="3886200" cy="2628900"/>
           </a:xfrm>
         </p:spPr>
         <p:txBody>
@@ -2062,8 +2063,8 @@
         </p:nvSpPr>
         <p:spPr>
           <a:xfrm>
-            <a:off x="609600" y="1816383"/>
-            <a:ext cx="3886200" cy="707136"/>
+            <a:off x="609600" y="1362287"/>
+            <a:ext cx="3886200" cy="530352"/>
           </a:xfrm>
           <a:solidFill>
             <a:schemeClr val="accent2"/>
@@ -2104,8 +2105,8 @@
         </p:nvSpPr>
         <p:spPr>
           <a:xfrm>
-            <a:off x="4800600" y="1816383"/>
-            <a:ext cx="3886200" cy="707136"/>
+            <a:off x="4800600" y="1362287"/>
+            <a:ext cx="3886200" cy="530352"/>
           </a:xfrm>
           <a:solidFill>
             <a:schemeClr val="accent4"/>
@@ -2356,8 +2357,8 @@
         </p:nvSpPr>
         <p:spPr>
           <a:xfrm>
-            <a:off x="0" y="6248400"/>
-            <a:ext cx="533400" cy="381000"/>
+            <a:off x="0" y="4686300"/>
+            <a:ext cx="533400" cy="285750"/>
           </a:xfrm>
         </p:spPr>
         <p:txBody>
@@ -2427,8 +2428,8 @@
         </p:nvSpPr>
         <p:spPr>
           <a:xfrm>
-            <a:off x="609600" y="157480"/>
-            <a:ext cx="8153400" cy="1341120"/>
+            <a:off x="609600" y="118110"/>
+            <a:ext cx="8153400" cy="1005840"/>
           </a:xfrm>
         </p:spPr>
         <p:txBody>
@@ -2549,8 +2550,8 @@
         </p:nvSpPr>
         <p:spPr>
           <a:xfrm>
-            <a:off x="609600" y="1905000"/>
-            <a:ext cx="1600200" cy="4165600"/>
+            <a:off x="609600" y="1428750"/>
+            <a:ext cx="1600200" cy="3124200"/>
           </a:xfrm>
           <a:ln w="50800" cap="sq" cmpd="dbl" algn="ctr">
             <a:solidFill>
@@ -2624,8 +2625,8 @@
         </p:nvSpPr>
         <p:spPr>
           <a:xfrm>
-            <a:off x="2362200" y="1905000"/>
-            <a:ext cx="6400800" cy="4267200"/>
+            <a:off x="2362200" y="1428750"/>
+            <a:ext cx="6400800" cy="3200400"/>
           </a:xfrm>
         </p:spPr>
         <p:txBody>
@@ -2714,7 +2715,7 @@
         <p:spPr>
           <a:xfrm>
             <a:off x="1557668" y="0"/>
-            <a:ext cx="7586332" cy="4559808"/>
+            <a:ext cx="7586332" cy="3419856"/>
           </a:xfrm>
           <a:solidFill>
             <a:schemeClr val="tx2">
@@ -2755,8 +2756,8 @@
         </p:nvSpPr>
         <p:spPr>
           <a:xfrm>
-            <a:off x="1600200" y="5486400"/>
-            <a:ext cx="7315200" cy="685800"/>
+            <a:off x="1600200" y="4114800"/>
+            <a:ext cx="7315200" cy="514350"/>
           </a:xfrm>
         </p:spPr>
         <p:txBody>
@@ -2806,8 +2807,8 @@
         </p:nvSpPr>
         <p:spPr>
           <a:xfrm>
-            <a:off x="-9144" y="4572000"/>
-            <a:ext cx="9144000" cy="886968"/>
+            <a:off x="-9144" y="3429000"/>
+            <a:ext cx="9144000" cy="665226"/>
           </a:xfrm>
           <a:prstGeom prst="rect">
             <a:avLst/>
@@ -2854,8 +2855,8 @@
         </p:nvSpPr>
         <p:spPr>
           <a:xfrm>
-            <a:off x="-9144" y="4663440"/>
-            <a:ext cx="1463040" cy="713232"/>
+            <a:off x="-9144" y="3497580"/>
+            <a:ext cx="1463040" cy="534924"/>
           </a:xfrm>
           <a:prstGeom prst="rect">
             <a:avLst/>
@@ -2904,8 +2905,8 @@
         </p:nvSpPr>
         <p:spPr>
           <a:xfrm>
-            <a:off x="1545336" y="4654296"/>
-            <a:ext cx="7589520" cy="713232"/>
+            <a:off x="1545336" y="3490722"/>
+            <a:ext cx="7589520" cy="534924"/>
           </a:xfrm>
           <a:prstGeom prst="rect">
             <a:avLst/>
@@ -2958,8 +2959,8 @@
         </p:nvSpPr>
         <p:spPr>
           <a:xfrm>
-            <a:off x="1600200" y="4724400"/>
-            <a:ext cx="7315200" cy="609600"/>
+            <a:off x="1600200" y="3543300"/>
+            <a:ext cx="7315200" cy="457200"/>
           </a:xfrm>
         </p:spPr>
         <p:txBody>
@@ -2993,7 +2994,7 @@
         <p:spPr>
           <a:xfrm>
             <a:off x="1447800" y="0"/>
-            <a:ext cx="100584" cy="6867144"/>
+            <a:ext cx="100584" cy="5150358"/>
           </a:xfrm>
           <a:prstGeom prst="rect">
             <a:avLst/>
@@ -3044,8 +3045,8 @@
         </p:nvSpPr>
         <p:spPr>
           <a:xfrm>
-            <a:off x="6248400" y="6248400"/>
-            <a:ext cx="2667000" cy="365125"/>
+            <a:off x="6248400" y="4686300"/>
+            <a:ext cx="2667000" cy="273844"/>
           </a:xfrm>
         </p:spPr>
         <p:txBody>
@@ -3075,8 +3076,8 @@
         </p:nvSpPr>
         <p:spPr>
           <a:xfrm>
-            <a:off x="0" y="4667249"/>
-            <a:ext cx="1447800" cy="663579"/>
+            <a:off x="0" y="3500437"/>
+            <a:ext cx="1447800" cy="497684"/>
           </a:xfrm>
         </p:spPr>
         <p:txBody>
@@ -3114,8 +3115,8 @@
         </p:nvSpPr>
         <p:spPr>
           <a:xfrm>
-            <a:off x="1600200" y="6248207"/>
-            <a:ext cx="4572000" cy="365125"/>
+            <a:off x="1600200" y="4686156"/>
+            <a:ext cx="4572000" cy="273844"/>
           </a:xfrm>
         </p:spPr>
         <p:txBody>
@@ -3181,7 +3182,7 @@
         <p:spPr>
           <a:xfrm>
             <a:off x="0" y="0"/>
-            <a:ext cx="9144000" cy="6858000"/>
+            <a:ext cx="9144000" cy="5143500"/>
           </a:xfrm>
           <a:prstGeom prst="rect">
             <a:avLst/>
@@ -3197,7 +3198,7 @@
         <p:spPr>
           <a:xfrm>
             <a:off x="0" y="0"/>
-            <a:ext cx="9144000" cy="6858000"/>
+            <a:ext cx="9144000" cy="5143500"/>
           </a:xfrm>
           <a:prstGeom prst="rect">
             <a:avLst/>
@@ -3243,8 +3244,8 @@
         </p:nvSpPr>
         <p:spPr>
           <a:xfrm>
-            <a:off x="612648" y="1803400"/>
-            <a:ext cx="8153400" cy="4323080"/>
+            <a:off x="612648" y="1352550"/>
+            <a:ext cx="8153400" cy="3242310"/>
           </a:xfrm>
           <a:prstGeom prst="rect">
             <a:avLst/>
@@ -3307,8 +3308,8 @@
         </p:nvSpPr>
         <p:spPr>
           <a:xfrm>
-            <a:off x="6096000" y="6248400"/>
-            <a:ext cx="2667000" cy="365125"/>
+            <a:off x="6096000" y="4686300"/>
+            <a:ext cx="2667000" cy="273844"/>
           </a:xfrm>
           <a:prstGeom prst="rect">
             <a:avLst/>
@@ -3348,8 +3349,8 @@
         </p:nvSpPr>
         <p:spPr>
           <a:xfrm>
-            <a:off x="609602" y="6248207"/>
-            <a:ext cx="5421083" cy="365125"/>
+            <a:off x="609603" y="4686156"/>
+            <a:ext cx="5421083" cy="273844"/>
           </a:xfrm>
           <a:prstGeom prst="rect">
             <a:avLst/>
@@ -3380,8 +3381,8 @@
         </p:nvSpPr>
         <p:spPr>
           <a:xfrm>
-            <a:off x="0" y="1460227"/>
-            <a:ext cx="9144000" cy="320040"/>
+            <a:off x="0" y="1095170"/>
+            <a:ext cx="9144000" cy="240030"/>
           </a:xfrm>
           <a:prstGeom prst="rect">
             <a:avLst/>
@@ -3432,8 +3433,8 @@
         </p:nvSpPr>
         <p:spPr>
           <a:xfrm>
-            <a:off x="0" y="1505947"/>
-            <a:ext cx="533400" cy="228600"/>
+            <a:off x="0" y="1129460"/>
+            <a:ext cx="533400" cy="171450"/>
           </a:xfrm>
           <a:prstGeom prst="rect">
             <a:avLst/>
@@ -3486,8 +3487,8 @@
         </p:nvSpPr>
         <p:spPr>
           <a:xfrm>
-            <a:off x="590550" y="1505947"/>
-            <a:ext cx="8553450" cy="228600"/>
+            <a:off x="590550" y="1129460"/>
+            <a:ext cx="8553450" cy="171450"/>
           </a:xfrm>
           <a:prstGeom prst="rect">
             <a:avLst/>
@@ -3544,8 +3545,8 @@
         </p:nvSpPr>
         <p:spPr>
           <a:xfrm>
-            <a:off x="0" y="1498010"/>
-            <a:ext cx="533400" cy="244476"/>
+            <a:off x="0" y="1123508"/>
+            <a:ext cx="533400" cy="183357"/>
           </a:xfrm>
           <a:prstGeom prst="rect">
             <a:avLst/>
@@ -3587,8 +3588,8 @@
         </p:nvSpPr>
         <p:spPr>
           <a:xfrm>
-            <a:off x="609600" y="157480"/>
-            <a:ext cx="8153400" cy="1341120"/>
+            <a:off x="609600" y="118110"/>
+            <a:ext cx="8153400" cy="1005840"/>
           </a:xfrm>
           <a:prstGeom prst="rect">
             <a:avLst/>
@@ -3948,8 +3949,8 @@
         </p:blipFill>
         <p:spPr>
           <a:xfrm>
-            <a:off x="0" y="270510"/>
-            <a:ext cx="9144000" cy="6587490"/>
+            <a:off x="0" y="202882"/>
+            <a:ext cx="9144000" cy="4940618"/>
           </a:xfrm>
           <a:prstGeom prst="rect">
             <a:avLst/>
@@ -3968,13 +3969,13 @@
         </p:nvSpPr>
         <p:spPr>
           <a:xfrm>
-            <a:off x="152400" y="5715000"/>
-            <a:ext cx="4953000" cy="1143000"/>
+            <a:off x="152400" y="4286250"/>
+            <a:ext cx="4953000" cy="857250"/>
           </a:xfrm>
         </p:spPr>
         <p:txBody>
           <a:bodyPr numCol="2">
-            <a:normAutofit fontScale="62500" lnSpcReduction="20000"/>
+            <a:normAutofit fontScale="55000" lnSpcReduction="20000"/>
           </a:bodyPr>
           <a:lstStyle>
             <a:extLst/>
@@ -4118,6 +4119,46 @@
           <a:bodyPr/>
           <a:lstStyle/>
           <a:p>
+            <a:endParaRPr lang="en-US"/>
+          </a:p>
+        </p:txBody>
+      </p:sp>
+      <p:sp>
+        <p:nvSpPr>
+          <p:cNvPr id="4" name="Action Button: Home 3">
+            <a:hlinkClick r:id="rId2" action="ppaction://hlinksldjump" highlightClick="1"/>
+          </p:cNvPr>
+          <p:cNvSpPr/>
+          <p:nvPr/>
+        </p:nvSpPr>
+        <p:spPr>
+          <a:xfrm>
+            <a:off x="609600" y="1123950"/>
+            <a:ext cx="152400" cy="152400"/>
+          </a:xfrm>
+          <a:prstGeom prst="actionButtonHome">
+            <a:avLst/>
+          </a:prstGeom>
+        </p:spPr>
+        <p:style>
+          <a:lnRef idx="1">
+            <a:schemeClr val="accent1"/>
+          </a:lnRef>
+          <a:fillRef idx="3">
+            <a:schemeClr val="accent1"/>
+          </a:fillRef>
+          <a:effectRef idx="2">
+            <a:schemeClr val="accent1"/>
+          </a:effectRef>
+          <a:fontRef idx="minor">
+            <a:schemeClr val="lt1"/>
+          </a:fontRef>
+        </p:style>
+        <p:txBody>
+          <a:bodyPr rtlCol="0" anchor="ctr"/>
+          <a:lstStyle/>
+          <a:p>
+            <a:pPr algn="ctr"/>
             <a:endParaRPr lang="en-US"/>
           </a:p>
         </p:txBody>
@@ -4217,6 +4258,46 @@
           </a:p>
         </p:txBody>
       </p:sp>
+      <p:sp>
+        <p:nvSpPr>
+          <p:cNvPr id="4" name="Action Button: Home 3">
+            <a:hlinkClick r:id="rId2" action="ppaction://hlinksldjump" highlightClick="1"/>
+          </p:cNvPr>
+          <p:cNvSpPr/>
+          <p:nvPr/>
+        </p:nvSpPr>
+        <p:spPr>
+          <a:xfrm>
+            <a:off x="609600" y="1123950"/>
+            <a:ext cx="152400" cy="152400"/>
+          </a:xfrm>
+          <a:prstGeom prst="actionButtonHome">
+            <a:avLst/>
+          </a:prstGeom>
+        </p:spPr>
+        <p:style>
+          <a:lnRef idx="1">
+            <a:schemeClr val="accent1"/>
+          </a:lnRef>
+          <a:fillRef idx="3">
+            <a:schemeClr val="accent1"/>
+          </a:fillRef>
+          <a:effectRef idx="2">
+            <a:schemeClr val="accent1"/>
+          </a:effectRef>
+          <a:fontRef idx="minor">
+            <a:schemeClr val="lt1"/>
+          </a:fontRef>
+        </p:style>
+        <p:txBody>
+          <a:bodyPr rtlCol="0" anchor="ctr"/>
+          <a:lstStyle/>
+          <a:p>
+            <a:pPr algn="ctr"/>
+            <a:endParaRPr lang="en-US"/>
+          </a:p>
+        </p:txBody>
+      </p:sp>
     </p:spTree>
     <p:extLst>
       <p:ext uri="{BB962C8B-B14F-4D97-AF65-F5344CB8AC3E}">
@@ -4308,6 +4389,46 @@
           </a:p>
         </p:txBody>
       </p:sp>
+      <p:sp>
+        <p:nvSpPr>
+          <p:cNvPr id="4" name="Action Button: Home 3">
+            <a:hlinkClick r:id="rId2" action="ppaction://hlinksldjump" highlightClick="1"/>
+          </p:cNvPr>
+          <p:cNvSpPr/>
+          <p:nvPr/>
+        </p:nvSpPr>
+        <p:spPr>
+          <a:xfrm>
+            <a:off x="609600" y="1123950"/>
+            <a:ext cx="152400" cy="152400"/>
+          </a:xfrm>
+          <a:prstGeom prst="actionButtonHome">
+            <a:avLst/>
+          </a:prstGeom>
+        </p:spPr>
+        <p:style>
+          <a:lnRef idx="1">
+            <a:schemeClr val="accent1"/>
+          </a:lnRef>
+          <a:fillRef idx="3">
+            <a:schemeClr val="accent1"/>
+          </a:fillRef>
+          <a:effectRef idx="2">
+            <a:schemeClr val="accent1"/>
+          </a:effectRef>
+          <a:fontRef idx="minor">
+            <a:schemeClr val="lt1"/>
+          </a:fontRef>
+        </p:style>
+        <p:txBody>
+          <a:bodyPr rtlCol="0" anchor="ctr"/>
+          <a:lstStyle/>
+          <a:p>
+            <a:pPr algn="ctr"/>
+            <a:endParaRPr lang="en-US"/>
+          </a:p>
+        </p:txBody>
+      </p:sp>
     </p:spTree>
     <p:extLst>
       <p:ext uri="{BB962C8B-B14F-4D97-AF65-F5344CB8AC3E}">
@@ -4401,6 +4522,46 @@
           </a:p>
         </p:txBody>
       </p:sp>
+      <p:sp>
+        <p:nvSpPr>
+          <p:cNvPr id="4" name="Action Button: Home 3">
+            <a:hlinkClick r:id="rId2" action="ppaction://hlinksldjump" highlightClick="1"/>
+          </p:cNvPr>
+          <p:cNvSpPr/>
+          <p:nvPr/>
+        </p:nvSpPr>
+        <p:spPr>
+          <a:xfrm>
+            <a:off x="609600" y="1123950"/>
+            <a:ext cx="152400" cy="152400"/>
+          </a:xfrm>
+          <a:prstGeom prst="actionButtonHome">
+            <a:avLst/>
+          </a:prstGeom>
+        </p:spPr>
+        <p:style>
+          <a:lnRef idx="1">
+            <a:schemeClr val="accent1"/>
+          </a:lnRef>
+          <a:fillRef idx="3">
+            <a:schemeClr val="accent1"/>
+          </a:fillRef>
+          <a:effectRef idx="2">
+            <a:schemeClr val="accent1"/>
+          </a:effectRef>
+          <a:fontRef idx="minor">
+            <a:schemeClr val="lt1"/>
+          </a:fontRef>
+        </p:style>
+        <p:txBody>
+          <a:bodyPr rtlCol="0" anchor="ctr"/>
+          <a:lstStyle/>
+          <a:p>
+            <a:pPr algn="ctr"/>
+            <a:endParaRPr lang="en-US"/>
+          </a:p>
+        </p:txBody>
+      </p:sp>
     </p:spTree>
     <p:extLst>
       <p:ext uri="{BB962C8B-B14F-4D97-AF65-F5344CB8AC3E}">
@@ -4492,6 +4653,46 @@
           </a:p>
         </p:txBody>
       </p:sp>
+      <p:sp>
+        <p:nvSpPr>
+          <p:cNvPr id="4" name="Action Button: Home 3">
+            <a:hlinkClick r:id="rId2" action="ppaction://hlinksldjump" highlightClick="1"/>
+          </p:cNvPr>
+          <p:cNvSpPr/>
+          <p:nvPr/>
+        </p:nvSpPr>
+        <p:spPr>
+          <a:xfrm>
+            <a:off x="609600" y="1123950"/>
+            <a:ext cx="152400" cy="152400"/>
+          </a:xfrm>
+          <a:prstGeom prst="actionButtonHome">
+            <a:avLst/>
+          </a:prstGeom>
+        </p:spPr>
+        <p:style>
+          <a:lnRef idx="1">
+            <a:schemeClr val="accent1"/>
+          </a:lnRef>
+          <a:fillRef idx="3">
+            <a:schemeClr val="accent1"/>
+          </a:fillRef>
+          <a:effectRef idx="2">
+            <a:schemeClr val="accent1"/>
+          </a:effectRef>
+          <a:fontRef idx="minor">
+            <a:schemeClr val="lt1"/>
+          </a:fontRef>
+        </p:style>
+        <p:txBody>
+          <a:bodyPr rtlCol="0" anchor="ctr"/>
+          <a:lstStyle/>
+          <a:p>
+            <a:pPr algn="ctr"/>
+            <a:endParaRPr lang="en-US"/>
+          </a:p>
+        </p:txBody>
+      </p:sp>
     </p:spTree>
     <p:extLst>
       <p:ext uri="{BB962C8B-B14F-4D97-AF65-F5344CB8AC3E}">
@@ -4589,6 +4790,46 @@
           </a:p>
         </p:txBody>
       </p:sp>
+      <p:sp>
+        <p:nvSpPr>
+          <p:cNvPr id="4" name="Action Button: Home 3">
+            <a:hlinkClick r:id="rId2" action="ppaction://hlinksldjump" highlightClick="1"/>
+          </p:cNvPr>
+          <p:cNvSpPr/>
+          <p:nvPr/>
+        </p:nvSpPr>
+        <p:spPr>
+          <a:xfrm>
+            <a:off x="609600" y="1123950"/>
+            <a:ext cx="152400" cy="152400"/>
+          </a:xfrm>
+          <a:prstGeom prst="actionButtonHome">
+            <a:avLst/>
+          </a:prstGeom>
+        </p:spPr>
+        <p:style>
+          <a:lnRef idx="1">
+            <a:schemeClr val="accent1"/>
+          </a:lnRef>
+          <a:fillRef idx="3">
+            <a:schemeClr val="accent1"/>
+          </a:fillRef>
+          <a:effectRef idx="2">
+            <a:schemeClr val="accent1"/>
+          </a:effectRef>
+          <a:fontRef idx="minor">
+            <a:schemeClr val="lt1"/>
+          </a:fontRef>
+        </p:style>
+        <p:txBody>
+          <a:bodyPr rtlCol="0" anchor="ctr"/>
+          <a:lstStyle/>
+          <a:p>
+            <a:pPr algn="ctr"/>
+            <a:endParaRPr lang="en-US"/>
+          </a:p>
+        </p:txBody>
+      </p:sp>
     </p:spTree>
     <p:extLst>
       <p:ext uri="{BB962C8B-B14F-4D97-AF65-F5344CB8AC3E}">
@@ -4618,6 +4859,407 @@
       </p:par>
     </p:tnLst>
   </p:timing>
+</p:sld>
+</file>
+
+<file path=ppt/slides/slide16.xml><?xml version="1.0" encoding="utf-8"?>
+<p:sld xmlns:a="http://schemas.openxmlformats.org/drawingml/2006/main" xmlns:r="http://schemas.openxmlformats.org/officeDocument/2006/relationships" xmlns:p="http://schemas.openxmlformats.org/presentationml/2006/main">
+  <p:cSld>
+    <p:spTree>
+      <p:nvGrpSpPr>
+        <p:cNvPr id="1" name=""/>
+        <p:cNvGrpSpPr/>
+        <p:nvPr/>
+      </p:nvGrpSpPr>
+      <p:grpSpPr>
+        <a:xfrm>
+          <a:off x="0" y="0"/>
+          <a:ext cx="0" cy="0"/>
+          <a:chOff x="0" y="0"/>
+          <a:chExt cx="0" cy="0"/>
+        </a:xfrm>
+      </p:grpSpPr>
+      <p:sp>
+        <p:nvSpPr>
+          <p:cNvPr id="2" name="Title 1"/>
+          <p:cNvSpPr>
+            <a:spLocks noGrp="1"/>
+          </p:cNvSpPr>
+          <p:nvPr>
+            <p:ph type="title"/>
+          </p:nvPr>
+        </p:nvSpPr>
+        <p:spPr/>
+        <p:txBody>
+          <a:bodyPr/>
+          <a:lstStyle/>
+          <a:p>
+            <a:r>
+              <a:rPr lang="en-US" smtClean="0"/>
+              <a:t>Links </a:t>
+            </a:r>
+            <a:r>
+              <a:rPr lang="en-US" dirty="0" smtClean="0"/>
+              <a:t>to Documents</a:t>
+            </a:r>
+            <a:endParaRPr lang="en-US" dirty="0"/>
+          </a:p>
+        </p:txBody>
+      </p:sp>
+      <p:sp>
+        <p:nvSpPr>
+          <p:cNvPr id="4" name="Action Button: Custom 3">
+            <a:hlinkClick r:id="rId2" action="ppaction://hlinkfile" highlightClick="1"/>
+          </p:cNvPr>
+          <p:cNvSpPr/>
+          <p:nvPr/>
+        </p:nvSpPr>
+        <p:spPr>
+          <a:xfrm>
+            <a:off x="1524000" y="1733550"/>
+            <a:ext cx="990600" cy="685800"/>
+          </a:xfrm>
+          <a:prstGeom prst="actionButtonBlank">
+            <a:avLst/>
+          </a:prstGeom>
+        </p:spPr>
+        <p:style>
+          <a:lnRef idx="1">
+            <a:schemeClr val="accent1"/>
+          </a:lnRef>
+          <a:fillRef idx="3">
+            <a:schemeClr val="accent1"/>
+          </a:fillRef>
+          <a:effectRef idx="2">
+            <a:schemeClr val="accent1"/>
+          </a:effectRef>
+          <a:fontRef idx="minor">
+            <a:schemeClr val="lt1"/>
+          </a:fontRef>
+        </p:style>
+        <p:txBody>
+          <a:bodyPr rtlCol="0" anchor="ctr"/>
+          <a:lstStyle/>
+          <a:p>
+            <a:pPr algn="ctr"/>
+            <a:r>
+              <a:rPr lang="en-US" dirty="0" smtClean="0">
+                <a:solidFill>
+                  <a:schemeClr val="tx1"/>
+                </a:solidFill>
+              </a:rPr>
+              <a:t>API</a:t>
+            </a:r>
+            <a:endParaRPr lang="en-US" dirty="0">
+              <a:solidFill>
+                <a:schemeClr val="tx1"/>
+              </a:solidFill>
+            </a:endParaRPr>
+          </a:p>
+        </p:txBody>
+      </p:sp>
+      <p:sp>
+        <p:nvSpPr>
+          <p:cNvPr id="5" name="Action Button: Document 4">
+            <a:hlinkClick r:id="rId3" action="ppaction://hlinkfile" highlightClick="1"/>
+          </p:cNvPr>
+          <p:cNvSpPr/>
+          <p:nvPr/>
+        </p:nvSpPr>
+        <p:spPr>
+          <a:xfrm>
+            <a:off x="2590800" y="2495550"/>
+            <a:ext cx="990600" cy="685800"/>
+          </a:xfrm>
+          <a:prstGeom prst="actionButtonDocument">
+            <a:avLst/>
+          </a:prstGeom>
+        </p:spPr>
+        <p:style>
+          <a:lnRef idx="1">
+            <a:schemeClr val="accent1"/>
+          </a:lnRef>
+          <a:fillRef idx="3">
+            <a:schemeClr val="accent1"/>
+          </a:fillRef>
+          <a:effectRef idx="2">
+            <a:schemeClr val="accent1"/>
+          </a:effectRef>
+          <a:fontRef idx="minor">
+            <a:schemeClr val="lt1"/>
+          </a:fontRef>
+        </p:style>
+        <p:txBody>
+          <a:bodyPr rtlCol="0" anchor="ctr"/>
+          <a:lstStyle/>
+          <a:p>
+            <a:pPr algn="ctr"/>
+            <a:r>
+              <a:rPr lang="en-US" sz="1100" dirty="0" smtClean="0">
+                <a:solidFill>
+                  <a:srgbClr val="000000"/>
+                </a:solidFill>
+              </a:rPr>
+              <a:t>Positional Argument</a:t>
+            </a:r>
+            <a:endParaRPr lang="en-US" sz="1100" dirty="0">
+              <a:solidFill>
+                <a:srgbClr val="000000"/>
+              </a:solidFill>
+            </a:endParaRPr>
+          </a:p>
+        </p:txBody>
+      </p:sp>
+      <p:sp>
+        <p:nvSpPr>
+          <p:cNvPr id="6" name="Action Button: Document 5">
+            <a:hlinkClick r:id="rId4" action="ppaction://hlinkfile" highlightClick="1"/>
+          </p:cNvPr>
+          <p:cNvSpPr/>
+          <p:nvPr/>
+        </p:nvSpPr>
+        <p:spPr>
+          <a:xfrm>
+            <a:off x="2590800" y="1733550"/>
+            <a:ext cx="990600" cy="685800"/>
+          </a:xfrm>
+          <a:prstGeom prst="actionButtonDocument">
+            <a:avLst/>
+          </a:prstGeom>
+        </p:spPr>
+        <p:style>
+          <a:lnRef idx="1">
+            <a:schemeClr val="accent1"/>
+          </a:lnRef>
+          <a:fillRef idx="3">
+            <a:schemeClr val="accent1"/>
+          </a:fillRef>
+          <a:effectRef idx="2">
+            <a:schemeClr val="accent1"/>
+          </a:effectRef>
+          <a:fontRef idx="minor">
+            <a:schemeClr val="lt1"/>
+          </a:fontRef>
+        </p:style>
+        <p:txBody>
+          <a:bodyPr rtlCol="0" anchor="ctr"/>
+          <a:lstStyle/>
+          <a:p>
+            <a:pPr algn="ctr"/>
+            <a:r>
+              <a:rPr lang="en-US" sz="1100" dirty="0" smtClean="0">
+                <a:solidFill>
+                  <a:srgbClr val="000000"/>
+                </a:solidFill>
+              </a:rPr>
+              <a:t>Argument</a:t>
+            </a:r>
+            <a:endParaRPr lang="en-US" sz="1100" dirty="0">
+              <a:solidFill>
+                <a:srgbClr val="000000"/>
+              </a:solidFill>
+            </a:endParaRPr>
+          </a:p>
+        </p:txBody>
+      </p:sp>
+      <p:sp>
+        <p:nvSpPr>
+          <p:cNvPr id="7" name="Action Button: Document 6">
+            <a:hlinkClick r:id="rId5" action="ppaction://hlinkfile" highlightClick="1"/>
+          </p:cNvPr>
+          <p:cNvSpPr/>
+          <p:nvPr/>
+        </p:nvSpPr>
+        <p:spPr>
+          <a:xfrm>
+            <a:off x="3657600" y="1733550"/>
+            <a:ext cx="990600" cy="685800"/>
+          </a:xfrm>
+          <a:prstGeom prst="actionButtonDocument">
+            <a:avLst/>
+          </a:prstGeom>
+        </p:spPr>
+        <p:style>
+          <a:lnRef idx="1">
+            <a:schemeClr val="accent1"/>
+          </a:lnRef>
+          <a:fillRef idx="3">
+            <a:schemeClr val="accent1"/>
+          </a:fillRef>
+          <a:effectRef idx="2">
+            <a:schemeClr val="accent1"/>
+          </a:effectRef>
+          <a:fontRef idx="minor">
+            <a:schemeClr val="lt1"/>
+          </a:fontRef>
+        </p:style>
+        <p:txBody>
+          <a:bodyPr rtlCol="0" anchor="ctr"/>
+          <a:lstStyle/>
+          <a:p>
+            <a:pPr algn="ctr"/>
+            <a:r>
+              <a:rPr lang="en-US" sz="1100" dirty="0" smtClean="0">
+                <a:solidFill>
+                  <a:srgbClr val="000000"/>
+                </a:solidFill>
+              </a:rPr>
+              <a:t>Argument Parser</a:t>
+            </a:r>
+          </a:p>
+        </p:txBody>
+      </p:sp>
+      <p:sp>
+        <p:nvSpPr>
+          <p:cNvPr id="8" name="Action Button: Document 7">
+            <a:hlinkClick r:id="rId6" action="ppaction://hlinkfile" highlightClick="1"/>
+          </p:cNvPr>
+          <p:cNvSpPr/>
+          <p:nvPr/>
+        </p:nvSpPr>
+        <p:spPr>
+          <a:xfrm>
+            <a:off x="3657600" y="2495550"/>
+            <a:ext cx="990600" cy="685800"/>
+          </a:xfrm>
+          <a:prstGeom prst="actionButtonDocument">
+            <a:avLst/>
+          </a:prstGeom>
+        </p:spPr>
+        <p:style>
+          <a:lnRef idx="1">
+            <a:schemeClr val="accent1"/>
+          </a:lnRef>
+          <a:fillRef idx="3">
+            <a:schemeClr val="accent1"/>
+          </a:fillRef>
+          <a:effectRef idx="2">
+            <a:schemeClr val="accent1"/>
+          </a:effectRef>
+          <a:fontRef idx="minor">
+            <a:schemeClr val="lt1"/>
+          </a:fontRef>
+        </p:style>
+        <p:txBody>
+          <a:bodyPr rtlCol="0" anchor="ctr"/>
+          <a:lstStyle/>
+          <a:p>
+            <a:pPr algn="ctr"/>
+            <a:r>
+              <a:rPr lang="en-US" sz="1100" dirty="0" smtClean="0">
+                <a:solidFill>
+                  <a:srgbClr val="000000"/>
+                </a:solidFill>
+              </a:rPr>
+              <a:t>XML Reader</a:t>
+            </a:r>
+          </a:p>
+        </p:txBody>
+      </p:sp>
+      <p:sp>
+        <p:nvSpPr>
+          <p:cNvPr id="9" name="Action Button: Document 8">
+            <a:hlinkClick r:id="rId7" action="ppaction://hlinkfile" highlightClick="1"/>
+          </p:cNvPr>
+          <p:cNvSpPr/>
+          <p:nvPr/>
+        </p:nvSpPr>
+        <p:spPr>
+          <a:xfrm>
+            <a:off x="2590800" y="3257550"/>
+            <a:ext cx="990600" cy="685800"/>
+          </a:xfrm>
+          <a:prstGeom prst="actionButtonDocument">
+            <a:avLst/>
+          </a:prstGeom>
+        </p:spPr>
+        <p:style>
+          <a:lnRef idx="1">
+            <a:schemeClr val="accent1"/>
+          </a:lnRef>
+          <a:fillRef idx="3">
+            <a:schemeClr val="accent1"/>
+          </a:fillRef>
+          <a:effectRef idx="2">
+            <a:schemeClr val="accent1"/>
+          </a:effectRef>
+          <a:fontRef idx="minor">
+            <a:schemeClr val="lt1"/>
+          </a:fontRef>
+        </p:style>
+        <p:txBody>
+          <a:bodyPr rtlCol="0" anchor="ctr"/>
+          <a:lstStyle/>
+          <a:p>
+            <a:pPr algn="ctr"/>
+            <a:r>
+              <a:rPr lang="en-US" sz="1100" dirty="0" smtClean="0">
+                <a:solidFill>
+                  <a:srgbClr val="000000"/>
+                </a:solidFill>
+              </a:rPr>
+              <a:t>Named Argument</a:t>
+            </a:r>
+          </a:p>
+        </p:txBody>
+      </p:sp>
+      <p:sp>
+        <p:nvSpPr>
+          <p:cNvPr id="10" name="Action Button: Document 9">
+            <a:hlinkClick r:id="rId8" action="ppaction://hlinkfile" highlightClick="1"/>
+          </p:cNvPr>
+          <p:cNvSpPr/>
+          <p:nvPr/>
+        </p:nvSpPr>
+        <p:spPr>
+          <a:xfrm>
+            <a:off x="3657600" y="3257550"/>
+            <a:ext cx="990600" cy="685800"/>
+          </a:xfrm>
+          <a:prstGeom prst="actionButtonDocument">
+            <a:avLst/>
+          </a:prstGeom>
+        </p:spPr>
+        <p:style>
+          <a:lnRef idx="1">
+            <a:schemeClr val="accent1"/>
+          </a:lnRef>
+          <a:fillRef idx="3">
+            <a:schemeClr val="accent1"/>
+          </a:fillRef>
+          <a:effectRef idx="2">
+            <a:schemeClr val="accent1"/>
+          </a:effectRef>
+          <a:fontRef idx="minor">
+            <a:schemeClr val="lt1"/>
+          </a:fontRef>
+        </p:style>
+        <p:txBody>
+          <a:bodyPr rtlCol="0" anchor="ctr"/>
+          <a:lstStyle/>
+          <a:p>
+            <a:pPr algn="ctr"/>
+            <a:r>
+              <a:rPr lang="en-US" sz="1100" dirty="0" smtClean="0">
+                <a:solidFill>
+                  <a:srgbClr val="000000"/>
+                </a:solidFill>
+              </a:rPr>
+              <a:t>Help Exception</a:t>
+            </a:r>
+          </a:p>
+        </p:txBody>
+      </p:sp>
+    </p:spTree>
+    <p:extLst>
+      <p:ext uri="{BB962C8B-B14F-4D97-AF65-F5344CB8AC3E}">
+        <p14:creationId xmlns:p14="http://schemas.microsoft.com/office/powerpoint/2010/main" val="1789444235"/>
+      </p:ext>
+    </p:extLst>
+  </p:cSld>
+  <p:clrMapOvr>
+    <a:masterClrMapping/>
+  </p:clrMapOvr>
 </p:sld>
 </file>
 
@@ -4660,8 +5302,8 @@
         </p:blipFill>
         <p:spPr>
           <a:xfrm flipH="1">
-            <a:off x="-381000" y="3048000"/>
-            <a:ext cx="3302000" cy="4000500"/>
+            <a:off x="-76200" y="2190750"/>
+            <a:ext cx="2971800" cy="3000375"/>
           </a:xfrm>
           <a:prstGeom prst="rect">
             <a:avLst/>
@@ -4699,8 +5341,8 @@
         </p:nvSpPr>
         <p:spPr>
           <a:xfrm>
-            <a:off x="1599003" y="1905000"/>
-            <a:ext cx="6566301" cy="4505227"/>
+            <a:off x="1599004" y="1428750"/>
+            <a:ext cx="6566301" cy="3378920"/>
           </a:xfrm>
           <a:custGeom>
             <a:avLst/>
@@ -4987,13 +5629,13 @@
         </p:nvSpPr>
         <p:spPr>
           <a:xfrm>
-            <a:off x="3124200" y="1905000"/>
-            <a:ext cx="5638800" cy="4267200"/>
+            <a:off x="3124200" y="1428750"/>
+            <a:ext cx="5638800" cy="3352800"/>
           </a:xfrm>
         </p:spPr>
         <p:txBody>
           <a:bodyPr>
-            <a:normAutofit fontScale="62500" lnSpcReduction="20000"/>
+            <a:normAutofit fontScale="40000" lnSpcReduction="20000"/>
           </a:bodyPr>
           <a:lstStyle/>
           <a:p>
@@ -5307,8 +5949,55 @@
                   </a:glow>
                 </a:effectLst>
               </a:rPr>
-              <a:t>Acceptance Test HTML screenshot</a:t>
-            </a:r>
+              <a:t>Acceptance Test HTML </a:t>
+            </a:r>
+            <a:r>
+              <a:rPr lang="en-US" b="1" dirty="0" smtClean="0">
+                <a:solidFill>
+                  <a:srgbClr val="0000B9"/>
+                </a:solidFill>
+                <a:effectLst>
+                  <a:glow rad="228600">
+                    <a:schemeClr val="accent2">
+                      <a:satMod val="175000"/>
+                      <a:alpha val="40000"/>
+                    </a:schemeClr>
+                  </a:glow>
+                </a:effectLst>
+              </a:rPr>
+              <a:t>screenshot</a:t>
+            </a:r>
+          </a:p>
+          <a:p>
+            <a:r>
+              <a:rPr lang="en-US" b="1" dirty="0" smtClean="0">
+                <a:solidFill>
+                  <a:srgbClr val="0000B9"/>
+                </a:solidFill>
+                <a:effectLst>
+                  <a:glow rad="228600">
+                    <a:schemeClr val="accent2">
+                      <a:satMod val="175000"/>
+                      <a:alpha val="40000"/>
+                    </a:schemeClr>
+                  </a:glow>
+                </a:effectLst>
+              </a:rPr>
+              <a:t>Links To Documents</a:t>
+            </a:r>
+            <a:endParaRPr lang="en-US" b="1" dirty="0">
+              <a:solidFill>
+                <a:srgbClr val="0000B9"/>
+              </a:solidFill>
+              <a:effectLst>
+                <a:glow rad="228600">
+                  <a:schemeClr val="accent2">
+                    <a:satMod val="175000"/>
+                    <a:alpha val="40000"/>
+                  </a:schemeClr>
+                </a:glow>
+              </a:effectLst>
+            </a:endParaRPr>
           </a:p>
           <a:p>
             <a:endParaRPr lang="en-US" dirty="0">
@@ -5324,6 +6013,566 @@
                 </a:glow>
               </a:effectLst>
             </a:endParaRPr>
+          </a:p>
+        </p:txBody>
+      </p:sp>
+      <p:sp>
+        <p:nvSpPr>
+          <p:cNvPr id="4" name="Action Button: Custom 3">
+            <a:hlinkClick r:id="rId3" action="ppaction://hlinksldjump" highlightClick="1"/>
+          </p:cNvPr>
+          <p:cNvSpPr/>
+          <p:nvPr/>
+        </p:nvSpPr>
+        <p:spPr>
+          <a:xfrm flipV="1">
+            <a:off x="3352800" y="1504950"/>
+            <a:ext cx="152400" cy="76200"/>
+          </a:xfrm>
+          <a:prstGeom prst="actionButtonBlank">
+            <a:avLst/>
+          </a:prstGeom>
+        </p:spPr>
+        <p:style>
+          <a:lnRef idx="1">
+            <a:schemeClr val="accent1"/>
+          </a:lnRef>
+          <a:fillRef idx="3">
+            <a:schemeClr val="accent1"/>
+          </a:fillRef>
+          <a:effectRef idx="2">
+            <a:schemeClr val="accent1"/>
+          </a:effectRef>
+          <a:fontRef idx="minor">
+            <a:schemeClr val="lt1"/>
+          </a:fontRef>
+        </p:style>
+        <p:txBody>
+          <a:bodyPr rtlCol="0" anchor="ctr"/>
+          <a:lstStyle/>
+          <a:p>
+            <a:pPr algn="ctr"/>
+            <a:endParaRPr lang="en-US"/>
+          </a:p>
+        </p:txBody>
+      </p:sp>
+      <p:sp>
+        <p:nvSpPr>
+          <p:cNvPr id="7" name="Action Button: Custom 6">
+            <a:hlinkClick r:id="rId4" action="ppaction://hlinksldjump" highlightClick="1"/>
+          </p:cNvPr>
+          <p:cNvSpPr/>
+          <p:nvPr/>
+        </p:nvSpPr>
+        <p:spPr>
+          <a:xfrm flipV="1">
+            <a:off x="3352800" y="1733550"/>
+            <a:ext cx="152400" cy="76200"/>
+          </a:xfrm>
+          <a:prstGeom prst="actionButtonBlank">
+            <a:avLst/>
+          </a:prstGeom>
+        </p:spPr>
+        <p:style>
+          <a:lnRef idx="1">
+            <a:schemeClr val="accent1"/>
+          </a:lnRef>
+          <a:fillRef idx="3">
+            <a:schemeClr val="accent1"/>
+          </a:fillRef>
+          <a:effectRef idx="2">
+            <a:schemeClr val="accent1"/>
+          </a:effectRef>
+          <a:fontRef idx="minor">
+            <a:schemeClr val="lt1"/>
+          </a:fontRef>
+        </p:style>
+        <p:txBody>
+          <a:bodyPr rtlCol="0" anchor="ctr"/>
+          <a:lstStyle/>
+          <a:p>
+            <a:pPr algn="ctr"/>
+            <a:endParaRPr lang="en-US"/>
+          </a:p>
+        </p:txBody>
+      </p:sp>
+      <p:sp>
+        <p:nvSpPr>
+          <p:cNvPr id="8" name="Action Button: Custom 7">
+            <a:hlinkClick r:id="rId5" action="ppaction://hlinksldjump" highlightClick="1"/>
+          </p:cNvPr>
+          <p:cNvSpPr/>
+          <p:nvPr/>
+        </p:nvSpPr>
+        <p:spPr>
+          <a:xfrm flipV="1">
+            <a:off x="3352800" y="1962150"/>
+            <a:ext cx="152400" cy="76200"/>
+          </a:xfrm>
+          <a:prstGeom prst="actionButtonBlank">
+            <a:avLst/>
+          </a:prstGeom>
+        </p:spPr>
+        <p:style>
+          <a:lnRef idx="1">
+            <a:schemeClr val="accent1"/>
+          </a:lnRef>
+          <a:fillRef idx="3">
+            <a:schemeClr val="accent1"/>
+          </a:fillRef>
+          <a:effectRef idx="2">
+            <a:schemeClr val="accent1"/>
+          </a:effectRef>
+          <a:fontRef idx="minor">
+            <a:schemeClr val="lt1"/>
+          </a:fontRef>
+        </p:style>
+        <p:txBody>
+          <a:bodyPr rtlCol="0" anchor="ctr"/>
+          <a:lstStyle/>
+          <a:p>
+            <a:pPr algn="ctr"/>
+            <a:endParaRPr lang="en-US"/>
+          </a:p>
+        </p:txBody>
+      </p:sp>
+      <p:sp>
+        <p:nvSpPr>
+          <p:cNvPr id="9" name="Action Button: Custom 8">
+            <a:hlinkClick r:id="rId6" action="ppaction://hlinksldjump" highlightClick="1"/>
+          </p:cNvPr>
+          <p:cNvSpPr/>
+          <p:nvPr/>
+        </p:nvSpPr>
+        <p:spPr>
+          <a:xfrm flipV="1">
+            <a:off x="3352800" y="2190750"/>
+            <a:ext cx="152400" cy="76200"/>
+          </a:xfrm>
+          <a:prstGeom prst="actionButtonBlank">
+            <a:avLst/>
+          </a:prstGeom>
+        </p:spPr>
+        <p:style>
+          <a:lnRef idx="1">
+            <a:schemeClr val="accent1"/>
+          </a:lnRef>
+          <a:fillRef idx="3">
+            <a:schemeClr val="accent1"/>
+          </a:fillRef>
+          <a:effectRef idx="2">
+            <a:schemeClr val="accent1"/>
+          </a:effectRef>
+          <a:fontRef idx="minor">
+            <a:schemeClr val="lt1"/>
+          </a:fontRef>
+        </p:style>
+        <p:txBody>
+          <a:bodyPr rtlCol="0" anchor="ctr"/>
+          <a:lstStyle/>
+          <a:p>
+            <a:pPr algn="ctr"/>
+            <a:endParaRPr lang="en-US"/>
+          </a:p>
+        </p:txBody>
+      </p:sp>
+      <p:sp>
+        <p:nvSpPr>
+          <p:cNvPr id="10" name="Action Button: Custom 9">
+            <a:hlinkClick r:id="rId7" action="ppaction://hlinksldjump" highlightClick="1"/>
+          </p:cNvPr>
+          <p:cNvSpPr/>
+          <p:nvPr/>
+        </p:nvSpPr>
+        <p:spPr>
+          <a:xfrm flipV="1">
+            <a:off x="3352800" y="2419350"/>
+            <a:ext cx="152400" cy="76200"/>
+          </a:xfrm>
+          <a:prstGeom prst="actionButtonBlank">
+            <a:avLst/>
+          </a:prstGeom>
+        </p:spPr>
+        <p:style>
+          <a:lnRef idx="1">
+            <a:schemeClr val="accent1"/>
+          </a:lnRef>
+          <a:fillRef idx="3">
+            <a:schemeClr val="accent1"/>
+          </a:fillRef>
+          <a:effectRef idx="2">
+            <a:schemeClr val="accent1"/>
+          </a:effectRef>
+          <a:fontRef idx="minor">
+            <a:schemeClr val="lt1"/>
+          </a:fontRef>
+        </p:style>
+        <p:txBody>
+          <a:bodyPr rtlCol="0" anchor="ctr"/>
+          <a:lstStyle/>
+          <a:p>
+            <a:pPr algn="ctr"/>
+            <a:endParaRPr lang="en-US"/>
+          </a:p>
+        </p:txBody>
+      </p:sp>
+      <p:sp>
+        <p:nvSpPr>
+          <p:cNvPr id="11" name="Action Button: Custom 10">
+            <a:hlinkClick r:id="rId8" action="ppaction://hlinksldjump" highlightClick="1"/>
+          </p:cNvPr>
+          <p:cNvSpPr/>
+          <p:nvPr/>
+        </p:nvSpPr>
+        <p:spPr>
+          <a:xfrm flipV="1">
+            <a:off x="3352800" y="2876550"/>
+            <a:ext cx="152400" cy="76200"/>
+          </a:xfrm>
+          <a:prstGeom prst="actionButtonBlank">
+            <a:avLst/>
+          </a:prstGeom>
+        </p:spPr>
+        <p:style>
+          <a:lnRef idx="1">
+            <a:schemeClr val="accent1"/>
+          </a:lnRef>
+          <a:fillRef idx="3">
+            <a:schemeClr val="accent1"/>
+          </a:fillRef>
+          <a:effectRef idx="2">
+            <a:schemeClr val="accent1"/>
+          </a:effectRef>
+          <a:fontRef idx="minor">
+            <a:schemeClr val="lt1"/>
+          </a:fontRef>
+        </p:style>
+        <p:txBody>
+          <a:bodyPr rtlCol="0" anchor="ctr"/>
+          <a:lstStyle/>
+          <a:p>
+            <a:pPr algn="ctr"/>
+            <a:endParaRPr lang="en-US"/>
+          </a:p>
+        </p:txBody>
+      </p:sp>
+      <p:sp>
+        <p:nvSpPr>
+          <p:cNvPr id="12" name="Action Button: Custom 11">
+            <a:hlinkClick r:id="rId7" action="ppaction://hlinksldjump" highlightClick="1"/>
+          </p:cNvPr>
+          <p:cNvSpPr/>
+          <p:nvPr/>
+        </p:nvSpPr>
+        <p:spPr>
+          <a:xfrm flipV="1">
+            <a:off x="3352800" y="2647950"/>
+            <a:ext cx="152400" cy="76200"/>
+          </a:xfrm>
+          <a:prstGeom prst="actionButtonBlank">
+            <a:avLst/>
+          </a:prstGeom>
+        </p:spPr>
+        <p:style>
+          <a:lnRef idx="1">
+            <a:schemeClr val="accent1"/>
+          </a:lnRef>
+          <a:fillRef idx="3">
+            <a:schemeClr val="accent1"/>
+          </a:fillRef>
+          <a:effectRef idx="2">
+            <a:schemeClr val="accent1"/>
+          </a:effectRef>
+          <a:fontRef idx="minor">
+            <a:schemeClr val="lt1"/>
+          </a:fontRef>
+        </p:style>
+        <p:txBody>
+          <a:bodyPr rtlCol="0" anchor="ctr"/>
+          <a:lstStyle/>
+          <a:p>
+            <a:pPr algn="ctr"/>
+            <a:endParaRPr lang="en-US"/>
+          </a:p>
+        </p:txBody>
+      </p:sp>
+      <p:sp>
+        <p:nvSpPr>
+          <p:cNvPr id="13" name="Action Button: Custom 12">
+            <a:hlinkClick r:id="rId9" action="ppaction://hlinksldjump" highlightClick="1"/>
+          </p:cNvPr>
+          <p:cNvSpPr/>
+          <p:nvPr/>
+        </p:nvSpPr>
+        <p:spPr>
+          <a:xfrm flipV="1">
+            <a:off x="3352800" y="3181350"/>
+            <a:ext cx="152400" cy="76200"/>
+          </a:xfrm>
+          <a:prstGeom prst="actionButtonBlank">
+            <a:avLst/>
+          </a:prstGeom>
+        </p:spPr>
+        <p:style>
+          <a:lnRef idx="1">
+            <a:schemeClr val="accent1"/>
+          </a:lnRef>
+          <a:fillRef idx="3">
+            <a:schemeClr val="accent1"/>
+          </a:fillRef>
+          <a:effectRef idx="2">
+            <a:schemeClr val="accent1"/>
+          </a:effectRef>
+          <a:fontRef idx="minor">
+            <a:schemeClr val="lt1"/>
+          </a:fontRef>
+        </p:style>
+        <p:txBody>
+          <a:bodyPr rtlCol="0" anchor="ctr"/>
+          <a:lstStyle/>
+          <a:p>
+            <a:pPr algn="ctr"/>
+            <a:endParaRPr lang="en-US"/>
+          </a:p>
+        </p:txBody>
+      </p:sp>
+      <p:sp>
+        <p:nvSpPr>
+          <p:cNvPr id="14" name="Action Button: Custom 13">
+            <a:hlinkClick r:id="rId10" action="ppaction://hlinksldjump" highlightClick="1"/>
+          </p:cNvPr>
+          <p:cNvSpPr/>
+          <p:nvPr/>
+        </p:nvSpPr>
+        <p:spPr>
+          <a:xfrm flipV="1">
+            <a:off x="3352800" y="3409950"/>
+            <a:ext cx="152400" cy="76200"/>
+          </a:xfrm>
+          <a:prstGeom prst="actionButtonBlank">
+            <a:avLst/>
+          </a:prstGeom>
+        </p:spPr>
+        <p:style>
+          <a:lnRef idx="1">
+            <a:schemeClr val="accent1"/>
+          </a:lnRef>
+          <a:fillRef idx="3">
+            <a:schemeClr val="accent1"/>
+          </a:fillRef>
+          <a:effectRef idx="2">
+            <a:schemeClr val="accent1"/>
+          </a:effectRef>
+          <a:fontRef idx="minor">
+            <a:schemeClr val="lt1"/>
+          </a:fontRef>
+        </p:style>
+        <p:txBody>
+          <a:bodyPr rtlCol="0" anchor="ctr"/>
+          <a:lstStyle/>
+          <a:p>
+            <a:pPr algn="ctr"/>
+            <a:endParaRPr lang="en-US"/>
+          </a:p>
+        </p:txBody>
+      </p:sp>
+      <p:sp>
+        <p:nvSpPr>
+          <p:cNvPr id="15" name="Action Button: Custom 14">
+            <a:hlinkClick r:id="rId11" action="ppaction://hlinksldjump" highlightClick="1"/>
+          </p:cNvPr>
+          <p:cNvSpPr/>
+          <p:nvPr/>
+        </p:nvSpPr>
+        <p:spPr>
+          <a:xfrm flipV="1">
+            <a:off x="3352800" y="3638550"/>
+            <a:ext cx="152400" cy="76200"/>
+          </a:xfrm>
+          <a:prstGeom prst="actionButtonBlank">
+            <a:avLst/>
+          </a:prstGeom>
+        </p:spPr>
+        <p:style>
+          <a:lnRef idx="1">
+            <a:schemeClr val="accent1"/>
+          </a:lnRef>
+          <a:fillRef idx="3">
+            <a:schemeClr val="accent1"/>
+          </a:fillRef>
+          <a:effectRef idx="2">
+            <a:schemeClr val="accent1"/>
+          </a:effectRef>
+          <a:fontRef idx="minor">
+            <a:schemeClr val="lt1"/>
+          </a:fontRef>
+        </p:style>
+        <p:txBody>
+          <a:bodyPr rtlCol="0" anchor="ctr"/>
+          <a:lstStyle/>
+          <a:p>
+            <a:pPr algn="ctr"/>
+            <a:endParaRPr lang="en-US"/>
+          </a:p>
+        </p:txBody>
+      </p:sp>
+      <p:sp>
+        <p:nvSpPr>
+          <p:cNvPr id="16" name="Action Button: Custom 15">
+            <a:hlinkClick r:id="rId12" action="ppaction://hlinksldjump" highlightClick="1"/>
+          </p:cNvPr>
+          <p:cNvSpPr/>
+          <p:nvPr/>
+        </p:nvSpPr>
+        <p:spPr>
+          <a:xfrm flipV="1">
+            <a:off x="3352800" y="4095750"/>
+            <a:ext cx="152400" cy="76200"/>
+          </a:xfrm>
+          <a:prstGeom prst="actionButtonBlank">
+            <a:avLst/>
+          </a:prstGeom>
+        </p:spPr>
+        <p:style>
+          <a:lnRef idx="1">
+            <a:schemeClr val="accent1"/>
+          </a:lnRef>
+          <a:fillRef idx="3">
+            <a:schemeClr val="accent1"/>
+          </a:fillRef>
+          <a:effectRef idx="2">
+            <a:schemeClr val="accent1"/>
+          </a:effectRef>
+          <a:fontRef idx="minor">
+            <a:schemeClr val="lt1"/>
+          </a:fontRef>
+        </p:style>
+        <p:txBody>
+          <a:bodyPr rtlCol="0" anchor="ctr"/>
+          <a:lstStyle/>
+          <a:p>
+            <a:pPr algn="ctr"/>
+            <a:endParaRPr lang="en-US"/>
+          </a:p>
+        </p:txBody>
+      </p:sp>
+      <p:sp>
+        <p:nvSpPr>
+          <p:cNvPr id="17" name="Action Button: Custom 16">
+            <a:hlinkClick r:id="rId13" action="ppaction://hlinksldjump" highlightClick="1"/>
+          </p:cNvPr>
+          <p:cNvSpPr/>
+          <p:nvPr/>
+        </p:nvSpPr>
+        <p:spPr>
+          <a:xfrm flipV="1">
+            <a:off x="3352800" y="3867150"/>
+            <a:ext cx="152400" cy="76200"/>
+          </a:xfrm>
+          <a:prstGeom prst="actionButtonBlank">
+            <a:avLst/>
+          </a:prstGeom>
+        </p:spPr>
+        <p:style>
+          <a:lnRef idx="1">
+            <a:schemeClr val="accent1"/>
+          </a:lnRef>
+          <a:fillRef idx="3">
+            <a:schemeClr val="accent1"/>
+          </a:fillRef>
+          <a:effectRef idx="2">
+            <a:schemeClr val="accent1"/>
+          </a:effectRef>
+          <a:fontRef idx="minor">
+            <a:schemeClr val="lt1"/>
+          </a:fontRef>
+        </p:style>
+        <p:txBody>
+          <a:bodyPr rtlCol="0" anchor="ctr"/>
+          <a:lstStyle/>
+          <a:p>
+            <a:pPr algn="ctr"/>
+            <a:endParaRPr lang="en-US"/>
+          </a:p>
+        </p:txBody>
+      </p:sp>
+      <p:sp>
+        <p:nvSpPr>
+          <p:cNvPr id="18" name="Action Button: Custom 17">
+            <a:hlinkClick r:id="rId14" action="ppaction://hlinksldjump" highlightClick="1"/>
+          </p:cNvPr>
+          <p:cNvSpPr/>
+          <p:nvPr/>
+        </p:nvSpPr>
+        <p:spPr>
+          <a:xfrm flipV="1">
+            <a:off x="3352800" y="4324350"/>
+            <a:ext cx="152400" cy="76200"/>
+          </a:xfrm>
+          <a:prstGeom prst="actionButtonBlank">
+            <a:avLst/>
+          </a:prstGeom>
+        </p:spPr>
+        <p:style>
+          <a:lnRef idx="1">
+            <a:schemeClr val="accent1"/>
+          </a:lnRef>
+          <a:fillRef idx="3">
+            <a:schemeClr val="accent1"/>
+          </a:fillRef>
+          <a:effectRef idx="2">
+            <a:schemeClr val="accent1"/>
+          </a:effectRef>
+          <a:fontRef idx="minor">
+            <a:schemeClr val="lt1"/>
+          </a:fontRef>
+        </p:style>
+        <p:txBody>
+          <a:bodyPr rtlCol="0" anchor="ctr"/>
+          <a:lstStyle/>
+          <a:p>
+            <a:pPr algn="ctr"/>
+            <a:endParaRPr lang="en-US"/>
+          </a:p>
+        </p:txBody>
+      </p:sp>
+      <p:sp>
+        <p:nvSpPr>
+          <p:cNvPr id="20" name="Action Button: Custom 19">
+            <a:hlinkClick r:id="rId15" action="ppaction://hlinksldjump" highlightClick="1"/>
+          </p:cNvPr>
+          <p:cNvSpPr/>
+          <p:nvPr/>
+        </p:nvSpPr>
+        <p:spPr>
+          <a:xfrm flipV="1">
+            <a:off x="3352800" y="4552950"/>
+            <a:ext cx="152400" cy="76200"/>
+          </a:xfrm>
+          <a:prstGeom prst="actionButtonBlank">
+            <a:avLst/>
+          </a:prstGeom>
+        </p:spPr>
+        <p:style>
+          <a:lnRef idx="1">
+            <a:schemeClr val="accent1"/>
+          </a:lnRef>
+          <a:fillRef idx="3">
+            <a:schemeClr val="accent1"/>
+          </a:fillRef>
+          <a:effectRef idx="2">
+            <a:schemeClr val="accent1"/>
+          </a:effectRef>
+          <a:fontRef idx="minor">
+            <a:schemeClr val="lt1"/>
+          </a:fontRef>
+        </p:style>
+        <p:txBody>
+          <a:bodyPr rtlCol="0" anchor="ctr"/>
+          <a:lstStyle/>
+          <a:p>
+            <a:pPr algn="ctr"/>
+            <a:endParaRPr lang="en-US"/>
           </a:p>
         </p:txBody>
       </p:sp>
@@ -5412,7 +6661,7 @@
         <p:spPr/>
         <p:txBody>
           <a:bodyPr>
-            <a:normAutofit fontScale="77500" lnSpcReduction="20000"/>
+            <a:normAutofit fontScale="70000" lnSpcReduction="20000"/>
           </a:bodyPr>
           <a:lstStyle/>
           <a:p>
@@ -5511,6 +6760,46 @@
           </a:p>
           <a:p>
             <a:endParaRPr lang="en-US" dirty="0"/>
+          </a:p>
+        </p:txBody>
+      </p:sp>
+      <p:sp>
+        <p:nvSpPr>
+          <p:cNvPr id="4" name="Action Button: Home 3">
+            <a:hlinkClick r:id="rId2" action="ppaction://hlinksldjump" highlightClick="1"/>
+          </p:cNvPr>
+          <p:cNvSpPr/>
+          <p:nvPr/>
+        </p:nvSpPr>
+        <p:spPr>
+          <a:xfrm>
+            <a:off x="609600" y="1123950"/>
+            <a:ext cx="152400" cy="152400"/>
+          </a:xfrm>
+          <a:prstGeom prst="actionButtonHome">
+            <a:avLst/>
+          </a:prstGeom>
+        </p:spPr>
+        <p:style>
+          <a:lnRef idx="1">
+            <a:schemeClr val="accent1"/>
+          </a:lnRef>
+          <a:fillRef idx="3">
+            <a:schemeClr val="accent1"/>
+          </a:fillRef>
+          <a:effectRef idx="2">
+            <a:schemeClr val="accent1"/>
+          </a:effectRef>
+          <a:fontRef idx="minor">
+            <a:schemeClr val="lt1"/>
+          </a:fontRef>
+        </p:style>
+        <p:txBody>
+          <a:bodyPr rtlCol="0" anchor="ctr"/>
+          <a:lstStyle/>
+          <a:p>
+            <a:pPr algn="ctr"/>
+            <a:endParaRPr lang="en-US"/>
           </a:p>
         </p:txBody>
       </p:sp>
@@ -5875,7 +7164,7 @@
         <p:spPr/>
         <p:txBody>
           <a:bodyPr>
-            <a:normAutofit fontScale="92500"/>
+            <a:normAutofit fontScale="85000" lnSpcReduction="20000"/>
           </a:bodyPr>
           <a:lstStyle/>
           <a:p>
@@ -5979,6 +7268,46 @@
           </a:p>
           <a:p>
             <a:endParaRPr lang="en-US" dirty="0"/>
+          </a:p>
+        </p:txBody>
+      </p:sp>
+      <p:sp>
+        <p:nvSpPr>
+          <p:cNvPr id="4" name="Action Button: Home 3">
+            <a:hlinkClick r:id="rId2" action="ppaction://hlinksldjump" highlightClick="1"/>
+          </p:cNvPr>
+          <p:cNvSpPr/>
+          <p:nvPr/>
+        </p:nvSpPr>
+        <p:spPr>
+          <a:xfrm>
+            <a:off x="609600" y="1123950"/>
+            <a:ext cx="152400" cy="152400"/>
+          </a:xfrm>
+          <a:prstGeom prst="actionButtonHome">
+            <a:avLst/>
+          </a:prstGeom>
+        </p:spPr>
+        <p:style>
+          <a:lnRef idx="1">
+            <a:schemeClr val="accent1"/>
+          </a:lnRef>
+          <a:fillRef idx="3">
+            <a:schemeClr val="accent1"/>
+          </a:fillRef>
+          <a:effectRef idx="2">
+            <a:schemeClr val="accent1"/>
+          </a:effectRef>
+          <a:fontRef idx="minor">
+            <a:schemeClr val="lt1"/>
+          </a:fontRef>
+        </p:style>
+        <p:txBody>
+          <a:bodyPr rtlCol="0" anchor="ctr"/>
+          <a:lstStyle/>
+          <a:p>
+            <a:pPr algn="ctr"/>
+            <a:endParaRPr lang="en-US"/>
           </a:p>
         </p:txBody>
       </p:sp>
@@ -6343,7 +7672,7 @@
         <p:spPr/>
         <p:txBody>
           <a:bodyPr>
-            <a:normAutofit lnSpcReduction="10000"/>
+            <a:normAutofit fontScale="85000" lnSpcReduction="20000"/>
           </a:bodyPr>
           <a:lstStyle/>
           <a:p>
@@ -6452,6 +7781,46 @@
               <a:buNone/>
             </a:pPr>
             <a:endParaRPr lang="en-US" dirty="0"/>
+          </a:p>
+        </p:txBody>
+      </p:sp>
+      <p:sp>
+        <p:nvSpPr>
+          <p:cNvPr id="4" name="Action Button: Home 3">
+            <a:hlinkClick r:id="rId2" action="ppaction://hlinksldjump" highlightClick="1"/>
+          </p:cNvPr>
+          <p:cNvSpPr/>
+          <p:nvPr/>
+        </p:nvSpPr>
+        <p:spPr>
+          <a:xfrm>
+            <a:off x="609600" y="1123950"/>
+            <a:ext cx="152400" cy="152400"/>
+          </a:xfrm>
+          <a:prstGeom prst="actionButtonHome">
+            <a:avLst/>
+          </a:prstGeom>
+        </p:spPr>
+        <p:style>
+          <a:lnRef idx="1">
+            <a:schemeClr val="accent1"/>
+          </a:lnRef>
+          <a:fillRef idx="3">
+            <a:schemeClr val="accent1"/>
+          </a:fillRef>
+          <a:effectRef idx="2">
+            <a:schemeClr val="accent1"/>
+          </a:effectRef>
+          <a:fontRef idx="minor">
+            <a:schemeClr val="lt1"/>
+          </a:fontRef>
+        </p:style>
+        <p:txBody>
+          <a:bodyPr rtlCol="0" anchor="ctr"/>
+          <a:lstStyle/>
+          <a:p>
+            <a:pPr algn="ctr"/>
+            <a:endParaRPr lang="en-US"/>
           </a:p>
         </p:txBody>
       </p:sp>
@@ -6790,8 +8159,16 @@
           <a:lstStyle/>
           <a:p>
             <a:r>
+              <a:rPr lang="en-US" dirty="0" err="1" smtClean="0"/>
+              <a:t>Api</a:t>
+            </a:r>
+            <a:r>
               <a:rPr lang="en-US" dirty="0" smtClean="0"/>
-              <a:t>API Description</a:t>
+              <a:t> </a:t>
+            </a:r>
+            <a:r>
+              <a:rPr lang="en-US" dirty="0" smtClean="0"/>
+              <a:t>Description</a:t>
             </a:r>
             <a:endParaRPr lang="en-US" dirty="0"/>
           </a:p>
@@ -6812,6 +8189,46 @@
           <a:bodyPr/>
           <a:lstStyle/>
           <a:p>
+            <a:endParaRPr lang="en-US"/>
+          </a:p>
+        </p:txBody>
+      </p:sp>
+      <p:sp>
+        <p:nvSpPr>
+          <p:cNvPr id="4" name="Action Button: Home 3">
+            <a:hlinkClick r:id="rId2" action="ppaction://hlinksldjump" highlightClick="1"/>
+          </p:cNvPr>
+          <p:cNvSpPr/>
+          <p:nvPr/>
+        </p:nvSpPr>
+        <p:spPr>
+          <a:xfrm>
+            <a:off x="609600" y="1123950"/>
+            <a:ext cx="152400" cy="152400"/>
+          </a:xfrm>
+          <a:prstGeom prst="actionButtonHome">
+            <a:avLst/>
+          </a:prstGeom>
+        </p:spPr>
+        <p:style>
+          <a:lnRef idx="1">
+            <a:schemeClr val="accent1"/>
+          </a:lnRef>
+          <a:fillRef idx="3">
+            <a:schemeClr val="accent1"/>
+          </a:fillRef>
+          <a:effectRef idx="2">
+            <a:schemeClr val="accent1"/>
+          </a:effectRef>
+          <a:fontRef idx="minor">
+            <a:schemeClr val="lt1"/>
+          </a:fontRef>
+        </p:style>
+        <p:txBody>
+          <a:bodyPr rtlCol="0" anchor="ctr"/>
+          <a:lstStyle/>
+          <a:p>
+            <a:pPr algn="ctr"/>
             <a:endParaRPr lang="en-US"/>
           </a:p>
         </p:txBody>
@@ -6871,8 +8288,16 @@
           <a:lstStyle/>
           <a:p>
             <a:r>
+              <a:rPr lang="en-US" dirty="0" err="1" smtClean="0"/>
+              <a:t>Api</a:t>
+            </a:r>
+            <a:r>
               <a:rPr lang="en-US" dirty="0" smtClean="0"/>
-              <a:t>API HOME Screenshot</a:t>
+              <a:t> Home </a:t>
+            </a:r>
+            <a:r>
+              <a:rPr lang="en-US" dirty="0" smtClean="0"/>
+              <a:t>Screenshot</a:t>
             </a:r>
             <a:endParaRPr lang="en-US" dirty="0"/>
           </a:p>
@@ -6880,19 +8305,144 @@
       </p:sp>
       <p:sp>
         <p:nvSpPr>
-          <p:cNvPr id="3" name="Content Placeholder 2"/>
-          <p:cNvSpPr>
-            <a:spLocks noGrp="1"/>
-          </p:cNvSpPr>
-          <p:nvPr>
-            <p:ph sz="quarter" idx="13"/>
-          </p:nvPr>
-        </p:nvSpPr>
-        <p:spPr/>
-        <p:txBody>
-          <a:bodyPr/>
+          <p:cNvPr id="4" name="Action Button: Custom 3">
+            <a:hlinkClick r:id="rId2" action="ppaction://hlinksldjump" highlightClick="1"/>
+          </p:cNvPr>
+          <p:cNvSpPr/>
+          <p:nvPr/>
+        </p:nvSpPr>
+        <p:spPr>
+          <a:xfrm>
+            <a:off x="1600200" y="1504950"/>
+            <a:ext cx="304800" cy="228600"/>
+          </a:xfrm>
+          <a:prstGeom prst="actionButtonBlank">
+            <a:avLst/>
+          </a:prstGeom>
+        </p:spPr>
+        <p:style>
+          <a:lnRef idx="1">
+            <a:schemeClr val="accent1"/>
+          </a:lnRef>
+          <a:fillRef idx="3">
+            <a:schemeClr val="accent1"/>
+          </a:fillRef>
+          <a:effectRef idx="2">
+            <a:schemeClr val="accent1"/>
+          </a:effectRef>
+          <a:fontRef idx="minor">
+            <a:schemeClr val="lt1"/>
+          </a:fontRef>
+        </p:style>
+        <p:txBody>
+          <a:bodyPr rtlCol="0" anchor="ctr"/>
           <a:lstStyle/>
           <a:p>
+            <a:pPr algn="ctr"/>
+            <a:r>
+              <a:rPr lang="en-US" dirty="0" smtClean="0">
+                <a:solidFill>
+                  <a:srgbClr val="FF0000"/>
+                </a:solidFill>
+              </a:rPr>
+              <a:t>1</a:t>
+            </a:r>
+            <a:endParaRPr lang="en-US" dirty="0">
+              <a:solidFill>
+                <a:srgbClr val="FF0000"/>
+              </a:solidFill>
+            </a:endParaRPr>
+          </a:p>
+        </p:txBody>
+      </p:sp>
+      <p:sp>
+        <p:nvSpPr>
+          <p:cNvPr id="5" name="Action Button: Custom 4">
+            <a:hlinkClick r:id="rId3" action="ppaction://hlinksldjump" highlightClick="1"/>
+          </p:cNvPr>
+          <p:cNvSpPr/>
+          <p:nvPr/>
+        </p:nvSpPr>
+        <p:spPr>
+          <a:xfrm>
+            <a:off x="1600200" y="1885950"/>
+            <a:ext cx="304800" cy="228600"/>
+          </a:xfrm>
+          <a:prstGeom prst="actionButtonBlank">
+            <a:avLst/>
+          </a:prstGeom>
+        </p:spPr>
+        <p:style>
+          <a:lnRef idx="1">
+            <a:schemeClr val="accent1"/>
+          </a:lnRef>
+          <a:fillRef idx="3">
+            <a:schemeClr val="accent1"/>
+          </a:fillRef>
+          <a:effectRef idx="2">
+            <a:schemeClr val="accent1"/>
+          </a:effectRef>
+          <a:fontRef idx="minor">
+            <a:schemeClr val="lt1"/>
+          </a:fontRef>
+        </p:style>
+        <p:txBody>
+          <a:bodyPr rtlCol="0" anchor="ctr"/>
+          <a:lstStyle/>
+          <a:p>
+            <a:pPr algn="ctr"/>
+            <a:r>
+              <a:rPr lang="en-US" dirty="0" smtClean="0">
+                <a:solidFill>
+                  <a:srgbClr val="FF0000"/>
+                </a:solidFill>
+              </a:rPr>
+              <a:t>2</a:t>
+            </a:r>
+            <a:endParaRPr lang="en-US" dirty="0">
+              <a:solidFill>
+                <a:srgbClr val="FF0000"/>
+              </a:solidFill>
+            </a:endParaRPr>
+          </a:p>
+        </p:txBody>
+      </p:sp>
+      <p:sp>
+        <p:nvSpPr>
+          <p:cNvPr id="6" name="Action Button: Home 5">
+            <a:hlinkClick r:id="rId4" action="ppaction://hlinksldjump" highlightClick="1"/>
+          </p:cNvPr>
+          <p:cNvSpPr/>
+          <p:nvPr/>
+        </p:nvSpPr>
+        <p:spPr>
+          <a:xfrm>
+            <a:off x="609600" y="1123950"/>
+            <a:ext cx="152400" cy="152400"/>
+          </a:xfrm>
+          <a:prstGeom prst="actionButtonHome">
+            <a:avLst/>
+          </a:prstGeom>
+        </p:spPr>
+        <p:style>
+          <a:lnRef idx="1">
+            <a:schemeClr val="accent1"/>
+          </a:lnRef>
+          <a:fillRef idx="3">
+            <a:schemeClr val="accent1"/>
+          </a:fillRef>
+          <a:effectRef idx="2">
+            <a:schemeClr val="accent1"/>
+          </a:effectRef>
+          <a:fontRef idx="minor">
+            <a:schemeClr val="lt1"/>
+          </a:fontRef>
+        </p:style>
+        <p:txBody>
+          <a:bodyPr rtlCol="0" anchor="ctr"/>
+          <a:lstStyle/>
+          <a:p>
+            <a:pPr algn="ctr"/>
             <a:endParaRPr lang="en-US"/>
           </a:p>
         </p:txBody>
@@ -6969,7 +8519,11 @@
             </a:r>
             <a:r>
               <a:rPr lang="en-US" baseline="0" dirty="0" smtClean="0"/>
-              <a:t> Screenshot 1 API</a:t>
+              <a:t> Screenshot 1 </a:t>
+            </a:r>
+            <a:r>
+              <a:rPr lang="en-US" baseline="0" dirty="0" err="1" smtClean="0"/>
+              <a:t>Api</a:t>
             </a:r>
             <a:endParaRPr lang="en-US" dirty="0"/>
           </a:p>
@@ -6990,6 +8544,98 @@
           <a:bodyPr/>
           <a:lstStyle/>
           <a:p>
+            <a:endParaRPr lang="en-US" dirty="0"/>
+          </a:p>
+        </p:txBody>
+      </p:sp>
+      <p:sp>
+        <p:nvSpPr>
+          <p:cNvPr id="4" name="Action Button: Custom 3">
+            <a:hlinkClick r:id="rId2" action="ppaction://hlinksldjump" highlightClick="1"/>
+          </p:cNvPr>
+          <p:cNvSpPr/>
+          <p:nvPr/>
+        </p:nvSpPr>
+        <p:spPr>
+          <a:xfrm>
+            <a:off x="152400" y="2266950"/>
+            <a:ext cx="990600" cy="152400"/>
+          </a:xfrm>
+          <a:prstGeom prst="actionButtonBlank">
+            <a:avLst/>
+          </a:prstGeom>
+        </p:spPr>
+        <p:style>
+          <a:lnRef idx="1">
+            <a:schemeClr val="accent1"/>
+          </a:lnRef>
+          <a:fillRef idx="3">
+            <a:schemeClr val="accent1"/>
+          </a:fillRef>
+          <a:effectRef idx="2">
+            <a:schemeClr val="accent1"/>
+          </a:effectRef>
+          <a:fontRef idx="minor">
+            <a:schemeClr val="lt1"/>
+          </a:fontRef>
+        </p:style>
+        <p:txBody>
+          <a:bodyPr rtlCol="0" anchor="ctr"/>
+          <a:lstStyle/>
+          <a:p>
+            <a:pPr algn="ctr"/>
+            <a:r>
+              <a:rPr lang="en-US" sz="1000" dirty="0" smtClean="0">
+                <a:solidFill>
+                  <a:srgbClr val="FF0000"/>
+                </a:solidFill>
+              </a:rPr>
+              <a:t>API HOME</a:t>
+            </a:r>
+            <a:endParaRPr lang="en-US" sz="1000" dirty="0">
+              <a:solidFill>
+                <a:srgbClr val="FF0000"/>
+              </a:solidFill>
+            </a:endParaRPr>
+          </a:p>
+        </p:txBody>
+      </p:sp>
+      <p:sp>
+        <p:nvSpPr>
+          <p:cNvPr id="5" name="Action Button: Home 4">
+            <a:hlinkClick r:id="rId3" action="ppaction://hlinksldjump" highlightClick="1"/>
+          </p:cNvPr>
+          <p:cNvSpPr/>
+          <p:nvPr/>
+        </p:nvSpPr>
+        <p:spPr>
+          <a:xfrm>
+            <a:off x="609600" y="1123950"/>
+            <a:ext cx="152400" cy="152400"/>
+          </a:xfrm>
+          <a:prstGeom prst="actionButtonHome">
+            <a:avLst/>
+          </a:prstGeom>
+        </p:spPr>
+        <p:style>
+          <a:lnRef idx="1">
+            <a:schemeClr val="accent1"/>
+          </a:lnRef>
+          <a:fillRef idx="3">
+            <a:schemeClr val="accent1"/>
+          </a:fillRef>
+          <a:effectRef idx="2">
+            <a:schemeClr val="accent1"/>
+          </a:effectRef>
+          <a:fontRef idx="minor">
+            <a:schemeClr val="lt1"/>
+          </a:fontRef>
+        </p:style>
+        <p:txBody>
+          <a:bodyPr rtlCol="0" anchor="ctr"/>
+          <a:lstStyle/>
+          <a:p>
+            <a:pPr algn="ctr"/>
             <a:endParaRPr lang="en-US"/>
           </a:p>
         </p:txBody>
@@ -7066,7 +8712,11 @@
             </a:r>
             <a:r>
               <a:rPr lang="en-US" baseline="0" dirty="0" smtClean="0"/>
-              <a:t> 2 API</a:t>
+              <a:t> 2 </a:t>
+            </a:r>
+            <a:r>
+              <a:rPr lang="en-US" baseline="0" dirty="0" err="1" smtClean="0"/>
+              <a:t>Api</a:t>
             </a:r>
             <a:endParaRPr lang="en-US" dirty="0"/>
           </a:p>
@@ -7087,6 +8737,98 @@
           <a:bodyPr/>
           <a:lstStyle/>
           <a:p>
+            <a:endParaRPr lang="en-US"/>
+          </a:p>
+        </p:txBody>
+      </p:sp>
+      <p:sp>
+        <p:nvSpPr>
+          <p:cNvPr id="4" name="Action Button: Custom 3">
+            <a:hlinkClick r:id="rId2" action="ppaction://hlinksldjump" highlightClick="1"/>
+          </p:cNvPr>
+          <p:cNvSpPr/>
+          <p:nvPr/>
+        </p:nvSpPr>
+        <p:spPr>
+          <a:xfrm>
+            <a:off x="152400" y="2266950"/>
+            <a:ext cx="990600" cy="152400"/>
+          </a:xfrm>
+          <a:prstGeom prst="actionButtonBlank">
+            <a:avLst/>
+          </a:prstGeom>
+        </p:spPr>
+        <p:style>
+          <a:lnRef idx="1">
+            <a:schemeClr val="accent1"/>
+          </a:lnRef>
+          <a:fillRef idx="3">
+            <a:schemeClr val="accent1"/>
+          </a:fillRef>
+          <a:effectRef idx="2">
+            <a:schemeClr val="accent1"/>
+          </a:effectRef>
+          <a:fontRef idx="minor">
+            <a:schemeClr val="lt1"/>
+          </a:fontRef>
+        </p:style>
+        <p:txBody>
+          <a:bodyPr rtlCol="0" anchor="ctr"/>
+          <a:lstStyle/>
+          <a:p>
+            <a:pPr algn="ctr"/>
+            <a:r>
+              <a:rPr lang="en-US" sz="1000" dirty="0" smtClean="0">
+                <a:solidFill>
+                  <a:srgbClr val="FF0000"/>
+                </a:solidFill>
+              </a:rPr>
+              <a:t>API HOME</a:t>
+            </a:r>
+            <a:endParaRPr lang="en-US" sz="1000" dirty="0">
+              <a:solidFill>
+                <a:srgbClr val="FF0000"/>
+              </a:solidFill>
+            </a:endParaRPr>
+          </a:p>
+        </p:txBody>
+      </p:sp>
+      <p:sp>
+        <p:nvSpPr>
+          <p:cNvPr id="5" name="Action Button: Home 4">
+            <a:hlinkClick r:id="rId3" action="ppaction://hlinksldjump" highlightClick="1"/>
+          </p:cNvPr>
+          <p:cNvSpPr/>
+          <p:nvPr/>
+        </p:nvSpPr>
+        <p:spPr>
+          <a:xfrm>
+            <a:off x="609600" y="1123950"/>
+            <a:ext cx="152400" cy="152400"/>
+          </a:xfrm>
+          <a:prstGeom prst="actionButtonHome">
+            <a:avLst/>
+          </a:prstGeom>
+        </p:spPr>
+        <p:style>
+          <a:lnRef idx="1">
+            <a:schemeClr val="accent1"/>
+          </a:lnRef>
+          <a:fillRef idx="3">
+            <a:schemeClr val="accent1"/>
+          </a:fillRef>
+          <a:effectRef idx="2">
+            <a:schemeClr val="accent1"/>
+          </a:effectRef>
+          <a:fontRef idx="minor">
+            <a:schemeClr val="lt1"/>
+          </a:fontRef>
+        </p:style>
+        <p:txBody>
+          <a:bodyPr rtlCol="0" anchor="ctr"/>
+          <a:lstStyle/>
+          <a:p>
+            <a:pPr algn="ctr"/>
             <a:endParaRPr lang="en-US"/>
           </a:p>
         </p:txBody>

</xml_diff>

<commit_message>
updated ArgParseEpisode5.pptx with more text and notes for during the presentation
</commit_message>
<xml_diff>
--- a/Sprint 5 Presentation/ArgParseEpisode5.pptx
+++ b/Sprint 5 Presentation/ArgParseEpisode5.pptx
@@ -569,6 +569,1461 @@
         </p:txBody>
       </p:sp>
     </p:spTree>
+  </p:cSld>
+  <p:clrMapOvr>
+    <a:masterClrMapping/>
+  </p:clrMapOvr>
+</p:notes>
+</file>
+
+<file path=ppt/notesSlides/notesSlide10.xml><?xml version="1.0" encoding="utf-8"?>
+<p:notes xmlns:a="http://schemas.openxmlformats.org/drawingml/2006/main" xmlns:r="http://schemas.openxmlformats.org/officeDocument/2006/relationships" xmlns:p="http://schemas.openxmlformats.org/presentationml/2006/main">
+  <p:cSld>
+    <p:spTree>
+      <p:nvGrpSpPr>
+        <p:cNvPr id="1" name=""/>
+        <p:cNvGrpSpPr/>
+        <p:nvPr/>
+      </p:nvGrpSpPr>
+      <p:grpSpPr>
+        <a:xfrm>
+          <a:off x="0" y="0"/>
+          <a:ext cx="0" cy="0"/>
+          <a:chOff x="0" y="0"/>
+          <a:chExt cx="0" cy="0"/>
+        </a:xfrm>
+      </p:grpSpPr>
+      <p:sp>
+        <p:nvSpPr>
+          <p:cNvPr id="2" name="Slide Image Placeholder 1"/>
+          <p:cNvSpPr>
+            <a:spLocks noGrp="1" noRot="1" noChangeAspect="1"/>
+          </p:cNvSpPr>
+          <p:nvPr>
+            <p:ph type="sldImg"/>
+          </p:nvPr>
+        </p:nvSpPr>
+        <p:spPr/>
+      </p:sp>
+      <p:sp>
+        <p:nvSpPr>
+          <p:cNvPr id="3" name="Notes Placeholder 2"/>
+          <p:cNvSpPr>
+            <a:spLocks noGrp="1"/>
+          </p:cNvSpPr>
+          <p:nvPr>
+            <p:ph type="body" idx="1"/>
+          </p:nvPr>
+        </p:nvSpPr>
+        <p:spPr/>
+        <p:txBody>
+          <a:bodyPr/>
+          <a:lstStyle/>
+          <a:p>
+            <a:endParaRPr lang="en-US"/>
+          </a:p>
+          <a:p>
+            <a:r>
+              <a:rPr lang="en-US"/>
+              <a:t>----- Meeting Notes (12/3/15 16:42) -----</a:t>
+            </a:r>
+          </a:p>
+          <a:p>
+            <a:r>
+              <a:rPr lang="en-US"/>
+              <a:t>This demo shows how our ArgParse library can be used basically from command line.</a:t>
+            </a:r>
+          </a:p>
+        </p:txBody>
+      </p:sp>
+      <p:sp>
+        <p:nvSpPr>
+          <p:cNvPr id="4" name="Slide Number Placeholder 3"/>
+          <p:cNvSpPr>
+            <a:spLocks noGrp="1"/>
+          </p:cNvSpPr>
+          <p:nvPr>
+            <p:ph type="sldNum" sz="quarter" idx="10"/>
+          </p:nvPr>
+        </p:nvSpPr>
+        <p:spPr/>
+        <p:txBody>
+          <a:bodyPr/>
+          <a:lstStyle/>
+          <a:p>
+            <a:fld id="{CA5D3BF3-D352-46FC-8343-31F56E6730EA}" type="slidenum">
+              <a:rPr lang="en-US" smtClean="0"/>
+              <a:pPr/>
+              <a:t>10</a:t>
+            </a:fld>
+            <a:endParaRPr lang="en-US"/>
+          </a:p>
+        </p:txBody>
+      </p:sp>
+    </p:spTree>
+    <p:extLst>
+      <p:ext uri="{BB962C8B-B14F-4D97-AF65-F5344CB8AC3E}">
+        <p14:creationId xmlns:p14="http://schemas.microsoft.com/office/powerpoint/2010/main" val="466557673"/>
+      </p:ext>
+    </p:extLst>
+  </p:cSld>
+  <p:clrMapOvr>
+    <a:masterClrMapping/>
+  </p:clrMapOvr>
+</p:notes>
+</file>
+
+<file path=ppt/notesSlides/notesSlide11.xml><?xml version="1.0" encoding="utf-8"?>
+<p:notes xmlns:a="http://schemas.openxmlformats.org/drawingml/2006/main" xmlns:r="http://schemas.openxmlformats.org/officeDocument/2006/relationships" xmlns:p="http://schemas.openxmlformats.org/presentationml/2006/main">
+  <p:cSld>
+    <p:spTree>
+      <p:nvGrpSpPr>
+        <p:cNvPr id="1" name=""/>
+        <p:cNvGrpSpPr/>
+        <p:nvPr/>
+      </p:nvGrpSpPr>
+      <p:grpSpPr>
+        <a:xfrm>
+          <a:off x="0" y="0"/>
+          <a:ext cx="0" cy="0"/>
+          <a:chOff x="0" y="0"/>
+          <a:chExt cx="0" cy="0"/>
+        </a:xfrm>
+      </p:grpSpPr>
+      <p:sp>
+        <p:nvSpPr>
+          <p:cNvPr id="2" name="Slide Image Placeholder 1"/>
+          <p:cNvSpPr>
+            <a:spLocks noGrp="1" noRot="1" noChangeAspect="1"/>
+          </p:cNvSpPr>
+          <p:nvPr>
+            <p:ph type="sldImg"/>
+          </p:nvPr>
+        </p:nvSpPr>
+        <p:spPr/>
+      </p:sp>
+      <p:sp>
+        <p:nvSpPr>
+          <p:cNvPr id="3" name="Notes Placeholder 2"/>
+          <p:cNvSpPr>
+            <a:spLocks noGrp="1"/>
+          </p:cNvSpPr>
+          <p:nvPr>
+            <p:ph type="body" idx="1"/>
+          </p:nvPr>
+        </p:nvSpPr>
+        <p:spPr/>
+        <p:txBody>
+          <a:bodyPr/>
+          <a:lstStyle/>
+          <a:p>
+            <a:endParaRPr lang="en-US"/>
+          </a:p>
+          <a:p>
+            <a:r>
+              <a:rPr lang="en-US"/>
+              <a:t>----- Meeting Notes (12/3/15 16:42) -----</a:t>
+            </a:r>
+          </a:p>
+          <a:p>
+            <a:r>
+              <a:rPr lang="en-US"/>
+              <a:t>This demo shows how our ArgParse library can read an XML file.</a:t>
+            </a:r>
+          </a:p>
+        </p:txBody>
+      </p:sp>
+      <p:sp>
+        <p:nvSpPr>
+          <p:cNvPr id="4" name="Slide Number Placeholder 3"/>
+          <p:cNvSpPr>
+            <a:spLocks noGrp="1"/>
+          </p:cNvSpPr>
+          <p:nvPr>
+            <p:ph type="sldNum" sz="quarter" idx="10"/>
+          </p:nvPr>
+        </p:nvSpPr>
+        <p:spPr/>
+        <p:txBody>
+          <a:bodyPr/>
+          <a:lstStyle/>
+          <a:p>
+            <a:fld id="{CA5D3BF3-D352-46FC-8343-31F56E6730EA}" type="slidenum">
+              <a:rPr lang="en-US" smtClean="0"/>
+              <a:pPr/>
+              <a:t>11</a:t>
+            </a:fld>
+            <a:endParaRPr lang="en-US"/>
+          </a:p>
+        </p:txBody>
+      </p:sp>
+    </p:spTree>
+    <p:extLst>
+      <p:ext uri="{BB962C8B-B14F-4D97-AF65-F5344CB8AC3E}">
+        <p14:creationId xmlns:p14="http://schemas.microsoft.com/office/powerpoint/2010/main" val="580458002"/>
+      </p:ext>
+    </p:extLst>
+  </p:cSld>
+  <p:clrMapOvr>
+    <a:masterClrMapping/>
+  </p:clrMapOvr>
+</p:notes>
+</file>
+
+<file path=ppt/notesSlides/notesSlide12.xml><?xml version="1.0" encoding="utf-8"?>
+<p:notes xmlns:a="http://schemas.openxmlformats.org/drawingml/2006/main" xmlns:r="http://schemas.openxmlformats.org/officeDocument/2006/relationships" xmlns:p="http://schemas.openxmlformats.org/presentationml/2006/main">
+  <p:cSld>
+    <p:spTree>
+      <p:nvGrpSpPr>
+        <p:cNvPr id="1" name=""/>
+        <p:cNvGrpSpPr/>
+        <p:nvPr/>
+      </p:nvGrpSpPr>
+      <p:grpSpPr>
+        <a:xfrm>
+          <a:off x="0" y="0"/>
+          <a:ext cx="0" cy="0"/>
+          <a:chOff x="0" y="0"/>
+          <a:chExt cx="0" cy="0"/>
+        </a:xfrm>
+      </p:grpSpPr>
+      <p:sp>
+        <p:nvSpPr>
+          <p:cNvPr id="2" name="Slide Image Placeholder 1"/>
+          <p:cNvSpPr>
+            <a:spLocks noGrp="1" noRot="1" noChangeAspect="1"/>
+          </p:cNvSpPr>
+          <p:nvPr>
+            <p:ph type="sldImg"/>
+          </p:nvPr>
+        </p:nvSpPr>
+        <p:spPr/>
+      </p:sp>
+      <p:sp>
+        <p:nvSpPr>
+          <p:cNvPr id="3" name="Notes Placeholder 2"/>
+          <p:cNvSpPr>
+            <a:spLocks noGrp="1"/>
+          </p:cNvSpPr>
+          <p:nvPr>
+            <p:ph type="body" idx="1"/>
+          </p:nvPr>
+        </p:nvSpPr>
+        <p:spPr/>
+        <p:txBody>
+          <a:bodyPr/>
+          <a:lstStyle/>
+          <a:p>
+            <a:endParaRPr lang="en-US"/>
+          </a:p>
+          <a:p>
+            <a:r>
+              <a:rPr lang="en-US"/>
+              <a:t>----- Meeting Notes (12/3/15 16:42) -----</a:t>
+            </a:r>
+          </a:p>
+          <a:p>
+            <a:r>
+              <a:rPr lang="en-US"/>
+              <a:t>This demo shows how our ArgParse library can write to XML files</a:t>
+            </a:r>
+          </a:p>
+        </p:txBody>
+      </p:sp>
+      <p:sp>
+        <p:nvSpPr>
+          <p:cNvPr id="4" name="Slide Number Placeholder 3"/>
+          <p:cNvSpPr>
+            <a:spLocks noGrp="1"/>
+          </p:cNvSpPr>
+          <p:nvPr>
+            <p:ph type="sldNum" sz="quarter" idx="10"/>
+          </p:nvPr>
+        </p:nvSpPr>
+        <p:spPr/>
+        <p:txBody>
+          <a:bodyPr/>
+          <a:lstStyle/>
+          <a:p>
+            <a:fld id="{CA5D3BF3-D352-46FC-8343-31F56E6730EA}" type="slidenum">
+              <a:rPr lang="en-US" smtClean="0"/>
+              <a:pPr/>
+              <a:t>12</a:t>
+            </a:fld>
+            <a:endParaRPr lang="en-US"/>
+          </a:p>
+        </p:txBody>
+      </p:sp>
+    </p:spTree>
+    <p:extLst>
+      <p:ext uri="{BB962C8B-B14F-4D97-AF65-F5344CB8AC3E}">
+        <p14:creationId xmlns:p14="http://schemas.microsoft.com/office/powerpoint/2010/main" val="1174614078"/>
+      </p:ext>
+    </p:extLst>
+  </p:cSld>
+  <p:clrMapOvr>
+    <a:masterClrMapping/>
+  </p:clrMapOvr>
+</p:notes>
+</file>
+
+<file path=ppt/notesSlides/notesSlide13.xml><?xml version="1.0" encoding="utf-8"?>
+<p:notes xmlns:a="http://schemas.openxmlformats.org/drawingml/2006/main" xmlns:r="http://schemas.openxmlformats.org/officeDocument/2006/relationships" xmlns:p="http://schemas.openxmlformats.org/presentationml/2006/main">
+  <p:cSld>
+    <p:spTree>
+      <p:nvGrpSpPr>
+        <p:cNvPr id="1" name=""/>
+        <p:cNvGrpSpPr/>
+        <p:nvPr/>
+      </p:nvGrpSpPr>
+      <p:grpSpPr>
+        <a:xfrm>
+          <a:off x="0" y="0"/>
+          <a:ext cx="0" cy="0"/>
+          <a:chOff x="0" y="0"/>
+          <a:chExt cx="0" cy="0"/>
+        </a:xfrm>
+      </p:grpSpPr>
+      <p:sp>
+        <p:nvSpPr>
+          <p:cNvPr id="2" name="Slide Image Placeholder 1"/>
+          <p:cNvSpPr>
+            <a:spLocks noGrp="1" noRot="1" noChangeAspect="1"/>
+          </p:cNvSpPr>
+          <p:nvPr>
+            <p:ph type="sldImg"/>
+          </p:nvPr>
+        </p:nvSpPr>
+        <p:spPr/>
+      </p:sp>
+      <p:sp>
+        <p:nvSpPr>
+          <p:cNvPr id="3" name="Notes Placeholder 2"/>
+          <p:cNvSpPr>
+            <a:spLocks noGrp="1"/>
+          </p:cNvSpPr>
+          <p:nvPr>
+            <p:ph type="body" idx="1"/>
+          </p:nvPr>
+        </p:nvSpPr>
+        <p:spPr/>
+        <p:txBody>
+          <a:bodyPr/>
+          <a:lstStyle/>
+          <a:p>
+            <a:endParaRPr lang="en-US"/>
+          </a:p>
+          <a:p>
+            <a:r>
+              <a:rPr lang="en-US"/>
+              <a:t>----- Meeting Notes (12/3/15 16:42) -----</a:t>
+            </a:r>
+          </a:p>
+          <a:p>
+            <a:r>
+              <a:rPr lang="en-US"/>
+              <a:t>We used unit tests to keep our code correct, and our code coverage is at (XX)%</a:t>
+            </a:r>
+          </a:p>
+        </p:txBody>
+      </p:sp>
+      <p:sp>
+        <p:nvSpPr>
+          <p:cNvPr id="4" name="Slide Number Placeholder 3"/>
+          <p:cNvSpPr>
+            <a:spLocks noGrp="1"/>
+          </p:cNvSpPr>
+          <p:nvPr>
+            <p:ph type="sldNum" sz="quarter" idx="10"/>
+          </p:nvPr>
+        </p:nvSpPr>
+        <p:spPr/>
+        <p:txBody>
+          <a:bodyPr/>
+          <a:lstStyle/>
+          <a:p>
+            <a:fld id="{CA5D3BF3-D352-46FC-8343-31F56E6730EA}" type="slidenum">
+              <a:rPr lang="en-US" smtClean="0"/>
+              <a:pPr/>
+              <a:t>13</a:t>
+            </a:fld>
+            <a:endParaRPr lang="en-US"/>
+          </a:p>
+        </p:txBody>
+      </p:sp>
+    </p:spTree>
+    <p:extLst>
+      <p:ext uri="{BB962C8B-B14F-4D97-AF65-F5344CB8AC3E}">
+        <p14:creationId xmlns:p14="http://schemas.microsoft.com/office/powerpoint/2010/main" val="521319177"/>
+      </p:ext>
+    </p:extLst>
+  </p:cSld>
+  <p:clrMapOvr>
+    <a:masterClrMapping/>
+  </p:clrMapOvr>
+</p:notes>
+</file>
+
+<file path=ppt/notesSlides/notesSlide14.xml><?xml version="1.0" encoding="utf-8"?>
+<p:notes xmlns:a="http://schemas.openxmlformats.org/drawingml/2006/main" xmlns:r="http://schemas.openxmlformats.org/officeDocument/2006/relationships" xmlns:p="http://schemas.openxmlformats.org/presentationml/2006/main">
+  <p:cSld>
+    <p:spTree>
+      <p:nvGrpSpPr>
+        <p:cNvPr id="1" name=""/>
+        <p:cNvGrpSpPr/>
+        <p:nvPr/>
+      </p:nvGrpSpPr>
+      <p:grpSpPr>
+        <a:xfrm>
+          <a:off x="0" y="0"/>
+          <a:ext cx="0" cy="0"/>
+          <a:chOff x="0" y="0"/>
+          <a:chExt cx="0" cy="0"/>
+        </a:xfrm>
+      </p:grpSpPr>
+      <p:sp>
+        <p:nvSpPr>
+          <p:cNvPr id="2" name="Slide Image Placeholder 1"/>
+          <p:cNvSpPr>
+            <a:spLocks noGrp="1" noRot="1" noChangeAspect="1"/>
+          </p:cNvSpPr>
+          <p:nvPr>
+            <p:ph type="sldImg"/>
+          </p:nvPr>
+        </p:nvSpPr>
+        <p:spPr/>
+      </p:sp>
+      <p:sp>
+        <p:nvSpPr>
+          <p:cNvPr id="3" name="Notes Placeholder 2"/>
+          <p:cNvSpPr>
+            <a:spLocks noGrp="1"/>
+          </p:cNvSpPr>
+          <p:nvPr>
+            <p:ph type="body" idx="1"/>
+          </p:nvPr>
+        </p:nvSpPr>
+        <p:spPr/>
+        <p:txBody>
+          <a:bodyPr/>
+          <a:lstStyle/>
+          <a:p>
+            <a:endParaRPr lang="en-US"/>
+          </a:p>
+          <a:p>
+            <a:r>
+              <a:rPr lang="en-US"/>
+              <a:t>----- Meeting Notes (12/3/15 16:42) -----</a:t>
+            </a:r>
+          </a:p>
+          <a:p>
+            <a:r>
+              <a:rPr lang="en-US"/>
+              <a:t>Product Owner gave us specified Acceptance Tests to check if our Features were working the way he wants. </a:t>
+            </a:r>
+          </a:p>
+        </p:txBody>
+      </p:sp>
+      <p:sp>
+        <p:nvSpPr>
+          <p:cNvPr id="4" name="Slide Number Placeholder 3"/>
+          <p:cNvSpPr>
+            <a:spLocks noGrp="1"/>
+          </p:cNvSpPr>
+          <p:nvPr>
+            <p:ph type="sldNum" sz="quarter" idx="10"/>
+          </p:nvPr>
+        </p:nvSpPr>
+        <p:spPr/>
+        <p:txBody>
+          <a:bodyPr/>
+          <a:lstStyle/>
+          <a:p>
+            <a:fld id="{CA5D3BF3-D352-46FC-8343-31F56E6730EA}" type="slidenum">
+              <a:rPr lang="en-US" smtClean="0"/>
+              <a:pPr/>
+              <a:t>14</a:t>
+            </a:fld>
+            <a:endParaRPr lang="en-US"/>
+          </a:p>
+        </p:txBody>
+      </p:sp>
+    </p:spTree>
+    <p:extLst>
+      <p:ext uri="{BB962C8B-B14F-4D97-AF65-F5344CB8AC3E}">
+        <p14:creationId xmlns:p14="http://schemas.microsoft.com/office/powerpoint/2010/main" val="3433322561"/>
+      </p:ext>
+    </p:extLst>
+  </p:cSld>
+  <p:clrMapOvr>
+    <a:masterClrMapping/>
+  </p:clrMapOvr>
+</p:notes>
+</file>
+
+<file path=ppt/notesSlides/notesSlide15.xml><?xml version="1.0" encoding="utf-8"?>
+<p:notes xmlns:a="http://schemas.openxmlformats.org/drawingml/2006/main" xmlns:r="http://schemas.openxmlformats.org/officeDocument/2006/relationships" xmlns:p="http://schemas.openxmlformats.org/presentationml/2006/main">
+  <p:cSld>
+    <p:spTree>
+      <p:nvGrpSpPr>
+        <p:cNvPr id="1" name=""/>
+        <p:cNvGrpSpPr/>
+        <p:nvPr/>
+      </p:nvGrpSpPr>
+      <p:grpSpPr>
+        <a:xfrm>
+          <a:off x="0" y="0"/>
+          <a:ext cx="0" cy="0"/>
+          <a:chOff x="0" y="0"/>
+          <a:chExt cx="0" cy="0"/>
+        </a:xfrm>
+      </p:grpSpPr>
+      <p:sp>
+        <p:nvSpPr>
+          <p:cNvPr id="2" name="Slide Image Placeholder 1"/>
+          <p:cNvSpPr>
+            <a:spLocks noGrp="1" noRot="1" noChangeAspect="1"/>
+          </p:cNvSpPr>
+          <p:nvPr>
+            <p:ph type="sldImg"/>
+          </p:nvPr>
+        </p:nvSpPr>
+        <p:spPr/>
+      </p:sp>
+      <p:sp>
+        <p:nvSpPr>
+          <p:cNvPr id="3" name="Notes Placeholder 2"/>
+          <p:cNvSpPr>
+            <a:spLocks noGrp="1"/>
+          </p:cNvSpPr>
+          <p:nvPr>
+            <p:ph type="body" idx="1"/>
+          </p:nvPr>
+        </p:nvSpPr>
+        <p:spPr/>
+        <p:txBody>
+          <a:bodyPr/>
+          <a:lstStyle/>
+          <a:p>
+            <a:endParaRPr lang="en-US"/>
+          </a:p>
+          <a:p>
+            <a:r>
+              <a:rPr lang="en-US"/>
+              <a:t>----- Meeting Notes (12/3/15 16:42) -----</a:t>
+            </a:r>
+          </a:p>
+          <a:p>
+            <a:r>
+              <a:rPr lang="en-US"/>
+              <a:t>We pass all the acceptance tests for the features we implemented.</a:t>
+            </a:r>
+          </a:p>
+        </p:txBody>
+      </p:sp>
+      <p:sp>
+        <p:nvSpPr>
+          <p:cNvPr id="4" name="Slide Number Placeholder 3"/>
+          <p:cNvSpPr>
+            <a:spLocks noGrp="1"/>
+          </p:cNvSpPr>
+          <p:nvPr>
+            <p:ph type="sldNum" sz="quarter" idx="10"/>
+          </p:nvPr>
+        </p:nvSpPr>
+        <p:spPr/>
+        <p:txBody>
+          <a:bodyPr/>
+          <a:lstStyle/>
+          <a:p>
+            <a:fld id="{CA5D3BF3-D352-46FC-8343-31F56E6730EA}" type="slidenum">
+              <a:rPr lang="en-US" smtClean="0"/>
+              <a:pPr/>
+              <a:t>15</a:t>
+            </a:fld>
+            <a:endParaRPr lang="en-US"/>
+          </a:p>
+        </p:txBody>
+      </p:sp>
+    </p:spTree>
+    <p:extLst>
+      <p:ext uri="{BB962C8B-B14F-4D97-AF65-F5344CB8AC3E}">
+        <p14:creationId xmlns:p14="http://schemas.microsoft.com/office/powerpoint/2010/main" val="2632466147"/>
+      </p:ext>
+    </p:extLst>
+  </p:cSld>
+  <p:clrMapOvr>
+    <a:masterClrMapping/>
+  </p:clrMapOvr>
+</p:notes>
+</file>
+
+<file path=ppt/notesSlides/notesSlide16.xml><?xml version="1.0" encoding="utf-8"?>
+<p:notes xmlns:a="http://schemas.openxmlformats.org/drawingml/2006/main" xmlns:r="http://schemas.openxmlformats.org/officeDocument/2006/relationships" xmlns:p="http://schemas.openxmlformats.org/presentationml/2006/main">
+  <p:cSld>
+    <p:spTree>
+      <p:nvGrpSpPr>
+        <p:cNvPr id="1" name=""/>
+        <p:cNvGrpSpPr/>
+        <p:nvPr/>
+      </p:nvGrpSpPr>
+      <p:grpSpPr>
+        <a:xfrm>
+          <a:off x="0" y="0"/>
+          <a:ext cx="0" cy="0"/>
+          <a:chOff x="0" y="0"/>
+          <a:chExt cx="0" cy="0"/>
+        </a:xfrm>
+      </p:grpSpPr>
+      <p:sp>
+        <p:nvSpPr>
+          <p:cNvPr id="2" name="Slide Image Placeholder 1"/>
+          <p:cNvSpPr>
+            <a:spLocks noGrp="1" noRot="1" noChangeAspect="1"/>
+          </p:cNvSpPr>
+          <p:nvPr>
+            <p:ph type="sldImg"/>
+          </p:nvPr>
+        </p:nvSpPr>
+        <p:spPr/>
+      </p:sp>
+      <p:sp>
+        <p:nvSpPr>
+          <p:cNvPr id="3" name="Notes Placeholder 2"/>
+          <p:cNvSpPr>
+            <a:spLocks noGrp="1"/>
+          </p:cNvSpPr>
+          <p:nvPr>
+            <p:ph type="body" idx="1"/>
+          </p:nvPr>
+        </p:nvSpPr>
+        <p:spPr/>
+        <p:txBody>
+          <a:bodyPr/>
+          <a:lstStyle/>
+          <a:p>
+            <a:endParaRPr lang="en-US"/>
+          </a:p>
+          <a:p>
+            <a:r>
+              <a:rPr lang="en-US"/>
+              <a:t>----- Meeting Notes (12/3/15 16:42) -----</a:t>
+            </a:r>
+          </a:p>
+          <a:p>
+            <a:r>
+              <a:rPr lang="en-US"/>
+              <a:t>We can click on a button to open the corresponding document.</a:t>
+            </a:r>
+          </a:p>
+        </p:txBody>
+      </p:sp>
+      <p:sp>
+        <p:nvSpPr>
+          <p:cNvPr id="4" name="Slide Number Placeholder 3"/>
+          <p:cNvSpPr>
+            <a:spLocks noGrp="1"/>
+          </p:cNvSpPr>
+          <p:nvPr>
+            <p:ph type="sldNum" sz="quarter" idx="10"/>
+          </p:nvPr>
+        </p:nvSpPr>
+        <p:spPr/>
+        <p:txBody>
+          <a:bodyPr/>
+          <a:lstStyle/>
+          <a:p>
+            <a:fld id="{CA5D3BF3-D352-46FC-8343-31F56E6730EA}" type="slidenum">
+              <a:rPr lang="en-US" smtClean="0"/>
+              <a:pPr/>
+              <a:t>16</a:t>
+            </a:fld>
+            <a:endParaRPr lang="en-US"/>
+          </a:p>
+        </p:txBody>
+      </p:sp>
+    </p:spTree>
+    <p:extLst>
+      <p:ext uri="{BB962C8B-B14F-4D97-AF65-F5344CB8AC3E}">
+        <p14:creationId xmlns:p14="http://schemas.microsoft.com/office/powerpoint/2010/main" val="1851126299"/>
+      </p:ext>
+    </p:extLst>
+  </p:cSld>
+  <p:clrMapOvr>
+    <a:masterClrMapping/>
+  </p:clrMapOvr>
+</p:notes>
+</file>
+
+<file path=ppt/notesSlides/notesSlide2.xml><?xml version="1.0" encoding="utf-8"?>
+<p:notes xmlns:a="http://schemas.openxmlformats.org/drawingml/2006/main" xmlns:r="http://schemas.openxmlformats.org/officeDocument/2006/relationships" xmlns:p="http://schemas.openxmlformats.org/presentationml/2006/main">
+  <p:cSld>
+    <p:spTree>
+      <p:nvGrpSpPr>
+        <p:cNvPr id="1" name=""/>
+        <p:cNvGrpSpPr/>
+        <p:nvPr/>
+      </p:nvGrpSpPr>
+      <p:grpSpPr>
+        <a:xfrm>
+          <a:off x="0" y="0"/>
+          <a:ext cx="0" cy="0"/>
+          <a:chOff x="0" y="0"/>
+          <a:chExt cx="0" cy="0"/>
+        </a:xfrm>
+      </p:grpSpPr>
+      <p:sp>
+        <p:nvSpPr>
+          <p:cNvPr id="2" name="Slide Image Placeholder 1"/>
+          <p:cNvSpPr>
+            <a:spLocks noGrp="1" noRot="1" noChangeAspect="1"/>
+          </p:cNvSpPr>
+          <p:nvPr>
+            <p:ph type="sldImg"/>
+          </p:nvPr>
+        </p:nvSpPr>
+        <p:spPr/>
+      </p:sp>
+      <p:sp>
+        <p:nvSpPr>
+          <p:cNvPr id="3" name="Notes Placeholder 2"/>
+          <p:cNvSpPr>
+            <a:spLocks noGrp="1"/>
+          </p:cNvSpPr>
+          <p:nvPr>
+            <p:ph type="body" idx="1"/>
+          </p:nvPr>
+        </p:nvSpPr>
+        <p:spPr/>
+        <p:txBody>
+          <a:bodyPr/>
+          <a:lstStyle/>
+          <a:p>
+            <a:endParaRPr lang="en-US"/>
+          </a:p>
+          <a:p>
+            <a:r>
+              <a:rPr lang="en-US"/>
+              <a:t>----- Meeting Notes (12/3/15 16:42) -----</a:t>
+            </a:r>
+          </a:p>
+          <a:p>
+            <a:r>
+              <a:rPr lang="en-US"/>
+              <a:t>Table of contents page</a:t>
+            </a:r>
+          </a:p>
+        </p:txBody>
+      </p:sp>
+      <p:sp>
+        <p:nvSpPr>
+          <p:cNvPr id="4" name="Slide Number Placeholder 3"/>
+          <p:cNvSpPr>
+            <a:spLocks noGrp="1"/>
+          </p:cNvSpPr>
+          <p:nvPr>
+            <p:ph type="sldNum" sz="quarter" idx="10"/>
+          </p:nvPr>
+        </p:nvSpPr>
+        <p:spPr/>
+        <p:txBody>
+          <a:bodyPr/>
+          <a:lstStyle/>
+          <a:p>
+            <a:fld id="{CA5D3BF3-D352-46FC-8343-31F56E6730EA}" type="slidenum">
+              <a:rPr lang="en-US" smtClean="0"/>
+              <a:pPr/>
+              <a:t>2</a:t>
+            </a:fld>
+            <a:endParaRPr lang="en-US"/>
+          </a:p>
+        </p:txBody>
+      </p:sp>
+    </p:spTree>
+    <p:extLst>
+      <p:ext uri="{BB962C8B-B14F-4D97-AF65-F5344CB8AC3E}">
+        <p14:creationId xmlns:p14="http://schemas.microsoft.com/office/powerpoint/2010/main" val="4096548516"/>
+      </p:ext>
+    </p:extLst>
+  </p:cSld>
+  <p:clrMapOvr>
+    <a:masterClrMapping/>
+  </p:clrMapOvr>
+</p:notes>
+</file>
+
+<file path=ppt/notesSlides/notesSlide3.xml><?xml version="1.0" encoding="utf-8"?>
+<p:notes xmlns:a="http://schemas.openxmlformats.org/drawingml/2006/main" xmlns:r="http://schemas.openxmlformats.org/officeDocument/2006/relationships" xmlns:p="http://schemas.openxmlformats.org/presentationml/2006/main">
+  <p:cSld>
+    <p:spTree>
+      <p:nvGrpSpPr>
+        <p:cNvPr id="1" name=""/>
+        <p:cNvGrpSpPr/>
+        <p:nvPr/>
+      </p:nvGrpSpPr>
+      <p:grpSpPr>
+        <a:xfrm>
+          <a:off x="0" y="0"/>
+          <a:ext cx="0" cy="0"/>
+          <a:chOff x="0" y="0"/>
+          <a:chExt cx="0" cy="0"/>
+        </a:xfrm>
+      </p:grpSpPr>
+      <p:sp>
+        <p:nvSpPr>
+          <p:cNvPr id="2" name="Slide Image Placeholder 1"/>
+          <p:cNvSpPr>
+            <a:spLocks noGrp="1" noRot="1" noChangeAspect="1"/>
+          </p:cNvSpPr>
+          <p:nvPr>
+            <p:ph type="sldImg"/>
+          </p:nvPr>
+        </p:nvSpPr>
+        <p:spPr/>
+      </p:sp>
+      <p:sp>
+        <p:nvSpPr>
+          <p:cNvPr id="3" name="Notes Placeholder 2"/>
+          <p:cNvSpPr>
+            <a:spLocks noGrp="1"/>
+          </p:cNvSpPr>
+          <p:nvPr>
+            <p:ph type="body" idx="1"/>
+          </p:nvPr>
+        </p:nvSpPr>
+        <p:spPr/>
+        <p:txBody>
+          <a:bodyPr/>
+          <a:lstStyle/>
+          <a:p>
+            <a:endParaRPr lang="en-US"/>
+          </a:p>
+          <a:p>
+            <a:r>
+              <a:rPr lang="en-US"/>
+              <a:t>----- Meeting Notes (12/3/15 16:42) -----</a:t>
+            </a:r>
+          </a:p>
+          <a:p>
+            <a:r>
+              <a:rPr lang="en-US"/>
+              <a:t>We implemented features 1-12, here we will give a brief description of Features 1-4.</a:t>
+            </a:r>
+          </a:p>
+        </p:txBody>
+      </p:sp>
+      <p:sp>
+        <p:nvSpPr>
+          <p:cNvPr id="4" name="Slide Number Placeholder 3"/>
+          <p:cNvSpPr>
+            <a:spLocks noGrp="1"/>
+          </p:cNvSpPr>
+          <p:nvPr>
+            <p:ph type="sldNum" sz="quarter" idx="10"/>
+          </p:nvPr>
+        </p:nvSpPr>
+        <p:spPr/>
+        <p:txBody>
+          <a:bodyPr/>
+          <a:lstStyle/>
+          <a:p>
+            <a:fld id="{CA5D3BF3-D352-46FC-8343-31F56E6730EA}" type="slidenum">
+              <a:rPr lang="en-US" smtClean="0"/>
+              <a:pPr/>
+              <a:t>3</a:t>
+            </a:fld>
+            <a:endParaRPr lang="en-US"/>
+          </a:p>
+        </p:txBody>
+      </p:sp>
+    </p:spTree>
+    <p:extLst>
+      <p:ext uri="{BB962C8B-B14F-4D97-AF65-F5344CB8AC3E}">
+        <p14:creationId xmlns:p14="http://schemas.microsoft.com/office/powerpoint/2010/main" val="336412220"/>
+      </p:ext>
+    </p:extLst>
+  </p:cSld>
+  <p:clrMapOvr>
+    <a:masterClrMapping/>
+  </p:clrMapOvr>
+</p:notes>
+</file>
+
+<file path=ppt/notesSlides/notesSlide4.xml><?xml version="1.0" encoding="utf-8"?>
+<p:notes xmlns:a="http://schemas.openxmlformats.org/drawingml/2006/main" xmlns:r="http://schemas.openxmlformats.org/officeDocument/2006/relationships" xmlns:p="http://schemas.openxmlformats.org/presentationml/2006/main">
+  <p:cSld>
+    <p:spTree>
+      <p:nvGrpSpPr>
+        <p:cNvPr id="1" name=""/>
+        <p:cNvGrpSpPr/>
+        <p:nvPr/>
+      </p:nvGrpSpPr>
+      <p:grpSpPr>
+        <a:xfrm>
+          <a:off x="0" y="0"/>
+          <a:ext cx="0" cy="0"/>
+          <a:chOff x="0" y="0"/>
+          <a:chExt cx="0" cy="0"/>
+        </a:xfrm>
+      </p:grpSpPr>
+      <p:sp>
+        <p:nvSpPr>
+          <p:cNvPr id="2" name="Slide Image Placeholder 1"/>
+          <p:cNvSpPr>
+            <a:spLocks noGrp="1" noRot="1" noChangeAspect="1"/>
+          </p:cNvSpPr>
+          <p:nvPr>
+            <p:ph type="sldImg"/>
+          </p:nvPr>
+        </p:nvSpPr>
+        <p:spPr/>
+      </p:sp>
+      <p:sp>
+        <p:nvSpPr>
+          <p:cNvPr id="3" name="Notes Placeholder 2"/>
+          <p:cNvSpPr>
+            <a:spLocks noGrp="1"/>
+          </p:cNvSpPr>
+          <p:nvPr>
+            <p:ph type="body" idx="1"/>
+          </p:nvPr>
+        </p:nvSpPr>
+        <p:spPr/>
+        <p:txBody>
+          <a:bodyPr/>
+          <a:lstStyle/>
+          <a:p>
+            <a:endParaRPr lang="en-US"/>
+          </a:p>
+          <a:p>
+            <a:r>
+              <a:rPr lang="en-US"/>
+              <a:t>----- Meeting Notes (12/3/15 16:42) -----</a:t>
+            </a:r>
+          </a:p>
+          <a:p>
+            <a:r>
+              <a:rPr lang="en-US"/>
+              <a:t>Here we have a brief description of features 5-8</a:t>
+            </a:r>
+          </a:p>
+        </p:txBody>
+      </p:sp>
+      <p:sp>
+        <p:nvSpPr>
+          <p:cNvPr id="4" name="Slide Number Placeholder 3"/>
+          <p:cNvSpPr>
+            <a:spLocks noGrp="1"/>
+          </p:cNvSpPr>
+          <p:nvPr>
+            <p:ph type="sldNum" sz="quarter" idx="10"/>
+          </p:nvPr>
+        </p:nvSpPr>
+        <p:spPr/>
+        <p:txBody>
+          <a:bodyPr/>
+          <a:lstStyle/>
+          <a:p>
+            <a:fld id="{CA5D3BF3-D352-46FC-8343-31F56E6730EA}" type="slidenum">
+              <a:rPr lang="en-US" smtClean="0"/>
+              <a:pPr/>
+              <a:t>4</a:t>
+            </a:fld>
+            <a:endParaRPr lang="en-US"/>
+          </a:p>
+        </p:txBody>
+      </p:sp>
+    </p:spTree>
+    <p:extLst>
+      <p:ext uri="{BB962C8B-B14F-4D97-AF65-F5344CB8AC3E}">
+        <p14:creationId xmlns:p14="http://schemas.microsoft.com/office/powerpoint/2010/main" val="1754075677"/>
+      </p:ext>
+    </p:extLst>
+  </p:cSld>
+  <p:clrMapOvr>
+    <a:masterClrMapping/>
+  </p:clrMapOvr>
+</p:notes>
+</file>
+
+<file path=ppt/notesSlides/notesSlide5.xml><?xml version="1.0" encoding="utf-8"?>
+<p:notes xmlns:a="http://schemas.openxmlformats.org/drawingml/2006/main" xmlns:r="http://schemas.openxmlformats.org/officeDocument/2006/relationships" xmlns:p="http://schemas.openxmlformats.org/presentationml/2006/main">
+  <p:cSld>
+    <p:spTree>
+      <p:nvGrpSpPr>
+        <p:cNvPr id="1" name=""/>
+        <p:cNvGrpSpPr/>
+        <p:nvPr/>
+      </p:nvGrpSpPr>
+      <p:grpSpPr>
+        <a:xfrm>
+          <a:off x="0" y="0"/>
+          <a:ext cx="0" cy="0"/>
+          <a:chOff x="0" y="0"/>
+          <a:chExt cx="0" cy="0"/>
+        </a:xfrm>
+      </p:grpSpPr>
+      <p:sp>
+        <p:nvSpPr>
+          <p:cNvPr id="2" name="Slide Image Placeholder 1"/>
+          <p:cNvSpPr>
+            <a:spLocks noGrp="1" noRot="1" noChangeAspect="1"/>
+          </p:cNvSpPr>
+          <p:nvPr>
+            <p:ph type="sldImg"/>
+          </p:nvPr>
+        </p:nvSpPr>
+        <p:spPr/>
+      </p:sp>
+      <p:sp>
+        <p:nvSpPr>
+          <p:cNvPr id="3" name="Notes Placeholder 2"/>
+          <p:cNvSpPr>
+            <a:spLocks noGrp="1"/>
+          </p:cNvSpPr>
+          <p:nvPr>
+            <p:ph type="body" idx="1"/>
+          </p:nvPr>
+        </p:nvSpPr>
+        <p:spPr/>
+        <p:txBody>
+          <a:bodyPr/>
+          <a:lstStyle/>
+          <a:p>
+            <a:endParaRPr lang="en-US"/>
+          </a:p>
+          <a:p>
+            <a:r>
+              <a:rPr lang="en-US"/>
+              <a:t>----- Meeting Notes (12/3/15 16:42) -----</a:t>
+            </a:r>
+          </a:p>
+          <a:p>
+            <a:r>
+              <a:rPr lang="en-US"/>
+              <a:t>Here we have a brief description of features 9-12. We will go into more detail on feature 11, as that is our API.</a:t>
+            </a:r>
+          </a:p>
+        </p:txBody>
+      </p:sp>
+      <p:sp>
+        <p:nvSpPr>
+          <p:cNvPr id="4" name="Slide Number Placeholder 3"/>
+          <p:cNvSpPr>
+            <a:spLocks noGrp="1"/>
+          </p:cNvSpPr>
+          <p:nvPr>
+            <p:ph type="sldNum" sz="quarter" idx="10"/>
+          </p:nvPr>
+        </p:nvSpPr>
+        <p:spPr/>
+        <p:txBody>
+          <a:bodyPr/>
+          <a:lstStyle/>
+          <a:p>
+            <a:fld id="{CA5D3BF3-D352-46FC-8343-31F56E6730EA}" type="slidenum">
+              <a:rPr lang="en-US" smtClean="0"/>
+              <a:pPr/>
+              <a:t>5</a:t>
+            </a:fld>
+            <a:endParaRPr lang="en-US"/>
+          </a:p>
+        </p:txBody>
+      </p:sp>
+    </p:spTree>
+    <p:extLst>
+      <p:ext uri="{BB962C8B-B14F-4D97-AF65-F5344CB8AC3E}">
+        <p14:creationId xmlns:p14="http://schemas.microsoft.com/office/powerpoint/2010/main" val="2322463371"/>
+      </p:ext>
+    </p:extLst>
+  </p:cSld>
+  <p:clrMapOvr>
+    <a:masterClrMapping/>
+  </p:clrMapOvr>
+</p:notes>
+</file>
+
+<file path=ppt/notesSlides/notesSlide6.xml><?xml version="1.0" encoding="utf-8"?>
+<p:notes xmlns:a="http://schemas.openxmlformats.org/drawingml/2006/main" xmlns:r="http://schemas.openxmlformats.org/officeDocument/2006/relationships" xmlns:p="http://schemas.openxmlformats.org/presentationml/2006/main">
+  <p:cSld>
+    <p:spTree>
+      <p:nvGrpSpPr>
+        <p:cNvPr id="1" name=""/>
+        <p:cNvGrpSpPr/>
+        <p:nvPr/>
+      </p:nvGrpSpPr>
+      <p:grpSpPr>
+        <a:xfrm>
+          <a:off x="0" y="0"/>
+          <a:ext cx="0" cy="0"/>
+          <a:chOff x="0" y="0"/>
+          <a:chExt cx="0" cy="0"/>
+        </a:xfrm>
+      </p:grpSpPr>
+      <p:sp>
+        <p:nvSpPr>
+          <p:cNvPr id="2" name="Slide Image Placeholder 1"/>
+          <p:cNvSpPr>
+            <a:spLocks noGrp="1" noRot="1" noChangeAspect="1"/>
+          </p:cNvSpPr>
+          <p:nvPr>
+            <p:ph type="sldImg"/>
+          </p:nvPr>
+        </p:nvSpPr>
+        <p:spPr/>
+      </p:sp>
+      <p:sp>
+        <p:nvSpPr>
+          <p:cNvPr id="3" name="Notes Placeholder 2"/>
+          <p:cNvSpPr>
+            <a:spLocks noGrp="1"/>
+          </p:cNvSpPr>
+          <p:nvPr>
+            <p:ph type="body" idx="1"/>
+          </p:nvPr>
+        </p:nvSpPr>
+        <p:spPr/>
+        <p:txBody>
+          <a:bodyPr/>
+          <a:lstStyle/>
+          <a:p>
+            <a:endParaRPr lang="en-US"/>
+          </a:p>
+          <a:p>
+            <a:r>
+              <a:rPr lang="en-US"/>
+              <a:t>----- Meeting Notes (12/3/15 16:42) -----</a:t>
+            </a:r>
+          </a:p>
+          <a:p>
+            <a:r>
+              <a:rPr lang="en-US"/>
+              <a:t>We added API documentation, and we use gradle (our build tool) to build our documentation. </a:t>
+            </a:r>
+          </a:p>
+        </p:txBody>
+      </p:sp>
+      <p:sp>
+        <p:nvSpPr>
+          <p:cNvPr id="4" name="Slide Number Placeholder 3"/>
+          <p:cNvSpPr>
+            <a:spLocks noGrp="1"/>
+          </p:cNvSpPr>
+          <p:nvPr>
+            <p:ph type="sldNum" sz="quarter" idx="10"/>
+          </p:nvPr>
+        </p:nvSpPr>
+        <p:spPr/>
+        <p:txBody>
+          <a:bodyPr/>
+          <a:lstStyle/>
+          <a:p>
+            <a:fld id="{CA5D3BF3-D352-46FC-8343-31F56E6730EA}" type="slidenum">
+              <a:rPr lang="en-US" smtClean="0"/>
+              <a:pPr/>
+              <a:t>6</a:t>
+            </a:fld>
+            <a:endParaRPr lang="en-US"/>
+          </a:p>
+        </p:txBody>
+      </p:sp>
+    </p:spTree>
+    <p:extLst>
+      <p:ext uri="{BB962C8B-B14F-4D97-AF65-F5344CB8AC3E}">
+        <p14:creationId xmlns:p14="http://schemas.microsoft.com/office/powerpoint/2010/main" val="1031865619"/>
+      </p:ext>
+    </p:extLst>
+  </p:cSld>
+  <p:clrMapOvr>
+    <a:masterClrMapping/>
+  </p:clrMapOvr>
+</p:notes>
+</file>
+
+<file path=ppt/notesSlides/notesSlide7.xml><?xml version="1.0" encoding="utf-8"?>
+<p:notes xmlns:a="http://schemas.openxmlformats.org/drawingml/2006/main" xmlns:r="http://schemas.openxmlformats.org/officeDocument/2006/relationships" xmlns:p="http://schemas.openxmlformats.org/presentationml/2006/main">
+  <p:cSld>
+    <p:spTree>
+      <p:nvGrpSpPr>
+        <p:cNvPr id="1" name=""/>
+        <p:cNvGrpSpPr/>
+        <p:nvPr/>
+      </p:nvGrpSpPr>
+      <p:grpSpPr>
+        <a:xfrm>
+          <a:off x="0" y="0"/>
+          <a:ext cx="0" cy="0"/>
+          <a:chOff x="0" y="0"/>
+          <a:chExt cx="0" cy="0"/>
+        </a:xfrm>
+      </p:grpSpPr>
+      <p:sp>
+        <p:nvSpPr>
+          <p:cNvPr id="2" name="Slide Image Placeholder 1"/>
+          <p:cNvSpPr>
+            <a:spLocks noGrp="1" noRot="1" noChangeAspect="1"/>
+          </p:cNvSpPr>
+          <p:nvPr>
+            <p:ph type="sldImg"/>
+          </p:nvPr>
+        </p:nvSpPr>
+        <p:spPr/>
+      </p:sp>
+      <p:sp>
+        <p:nvSpPr>
+          <p:cNvPr id="3" name="Notes Placeholder 2"/>
+          <p:cNvSpPr>
+            <a:spLocks noGrp="1"/>
+          </p:cNvSpPr>
+          <p:nvPr>
+            <p:ph type="body" idx="1"/>
+          </p:nvPr>
+        </p:nvSpPr>
+        <p:spPr/>
+        <p:txBody>
+          <a:bodyPr/>
+          <a:lstStyle/>
+          <a:p>
+            <a:endParaRPr lang="en-US"/>
+          </a:p>
+          <a:p>
+            <a:r>
+              <a:rPr lang="en-US"/>
+              <a:t>----- Meeting Notes (12/3/15 16:42) -----</a:t>
+            </a:r>
+          </a:p>
+          <a:p>
+            <a:r>
+              <a:rPr lang="en-US"/>
+              <a:t>This is what our API index page looks like. We will click one of the options to take a closer look.</a:t>
+            </a:r>
+          </a:p>
+        </p:txBody>
+      </p:sp>
+      <p:sp>
+        <p:nvSpPr>
+          <p:cNvPr id="4" name="Slide Number Placeholder 3"/>
+          <p:cNvSpPr>
+            <a:spLocks noGrp="1"/>
+          </p:cNvSpPr>
+          <p:nvPr>
+            <p:ph type="sldNum" sz="quarter" idx="10"/>
+          </p:nvPr>
+        </p:nvSpPr>
+        <p:spPr/>
+        <p:txBody>
+          <a:bodyPr/>
+          <a:lstStyle/>
+          <a:p>
+            <a:fld id="{CA5D3BF3-D352-46FC-8343-31F56E6730EA}" type="slidenum">
+              <a:rPr lang="en-US" smtClean="0"/>
+              <a:pPr/>
+              <a:t>7</a:t>
+            </a:fld>
+            <a:endParaRPr lang="en-US"/>
+          </a:p>
+        </p:txBody>
+      </p:sp>
+    </p:spTree>
+    <p:extLst>
+      <p:ext uri="{BB962C8B-B14F-4D97-AF65-F5344CB8AC3E}">
+        <p14:creationId xmlns:p14="http://schemas.microsoft.com/office/powerpoint/2010/main" val="1423786827"/>
+      </p:ext>
+    </p:extLst>
+  </p:cSld>
+  <p:clrMapOvr>
+    <a:masterClrMapping/>
+  </p:clrMapOvr>
+</p:notes>
+</file>
+
+<file path=ppt/notesSlides/notesSlide8.xml><?xml version="1.0" encoding="utf-8"?>
+<p:notes xmlns:a="http://schemas.openxmlformats.org/drawingml/2006/main" xmlns:r="http://schemas.openxmlformats.org/officeDocument/2006/relationships" xmlns:p="http://schemas.openxmlformats.org/presentationml/2006/main">
+  <p:cSld>
+    <p:spTree>
+      <p:nvGrpSpPr>
+        <p:cNvPr id="1" name=""/>
+        <p:cNvGrpSpPr/>
+        <p:nvPr/>
+      </p:nvGrpSpPr>
+      <p:grpSpPr>
+        <a:xfrm>
+          <a:off x="0" y="0"/>
+          <a:ext cx="0" cy="0"/>
+          <a:chOff x="0" y="0"/>
+          <a:chExt cx="0" cy="0"/>
+        </a:xfrm>
+      </p:grpSpPr>
+      <p:sp>
+        <p:nvSpPr>
+          <p:cNvPr id="2" name="Slide Image Placeholder 1"/>
+          <p:cNvSpPr>
+            <a:spLocks noGrp="1" noRot="1" noChangeAspect="1"/>
+          </p:cNvSpPr>
+          <p:nvPr>
+            <p:ph type="sldImg"/>
+          </p:nvPr>
+        </p:nvSpPr>
+        <p:spPr/>
+      </p:sp>
+      <p:sp>
+        <p:nvSpPr>
+          <p:cNvPr id="3" name="Notes Placeholder 2"/>
+          <p:cNvSpPr>
+            <a:spLocks noGrp="1"/>
+          </p:cNvSpPr>
+          <p:nvPr>
+            <p:ph type="body" idx="1"/>
+          </p:nvPr>
+        </p:nvSpPr>
+        <p:spPr/>
+        <p:txBody>
+          <a:bodyPr/>
+          <a:lstStyle/>
+          <a:p>
+            <a:endParaRPr lang="en-US"/>
+          </a:p>
+          <a:p>
+            <a:r>
+              <a:rPr lang="en-US"/>
+              <a:t>----- Meeting Notes (12/3/15 16:42) -----</a:t>
+            </a:r>
+          </a:p>
+          <a:p>
+            <a:r>
+              <a:rPr lang="en-US"/>
+              <a:t>This is the (nameOfClass).</a:t>
+            </a:r>
+          </a:p>
+        </p:txBody>
+      </p:sp>
+      <p:sp>
+        <p:nvSpPr>
+          <p:cNvPr id="4" name="Slide Number Placeholder 3"/>
+          <p:cNvSpPr>
+            <a:spLocks noGrp="1"/>
+          </p:cNvSpPr>
+          <p:nvPr>
+            <p:ph type="sldNum" sz="quarter" idx="10"/>
+          </p:nvPr>
+        </p:nvSpPr>
+        <p:spPr/>
+        <p:txBody>
+          <a:bodyPr/>
+          <a:lstStyle/>
+          <a:p>
+            <a:fld id="{CA5D3BF3-D352-46FC-8343-31F56E6730EA}" type="slidenum">
+              <a:rPr lang="en-US" smtClean="0"/>
+              <a:pPr/>
+              <a:t>8</a:t>
+            </a:fld>
+            <a:endParaRPr lang="en-US"/>
+          </a:p>
+        </p:txBody>
+      </p:sp>
+    </p:spTree>
+    <p:extLst>
+      <p:ext uri="{BB962C8B-B14F-4D97-AF65-F5344CB8AC3E}">
+        <p14:creationId xmlns:p14="http://schemas.microsoft.com/office/powerpoint/2010/main" val="22271550"/>
+      </p:ext>
+    </p:extLst>
+  </p:cSld>
+  <p:clrMapOvr>
+    <a:masterClrMapping/>
+  </p:clrMapOvr>
+</p:notes>
+</file>
+
+<file path=ppt/notesSlides/notesSlide9.xml><?xml version="1.0" encoding="utf-8"?>
+<p:notes xmlns:a="http://schemas.openxmlformats.org/drawingml/2006/main" xmlns:r="http://schemas.openxmlformats.org/officeDocument/2006/relationships" xmlns:p="http://schemas.openxmlformats.org/presentationml/2006/main">
+  <p:cSld>
+    <p:spTree>
+      <p:nvGrpSpPr>
+        <p:cNvPr id="1" name=""/>
+        <p:cNvGrpSpPr/>
+        <p:nvPr/>
+      </p:nvGrpSpPr>
+      <p:grpSpPr>
+        <a:xfrm>
+          <a:off x="0" y="0"/>
+          <a:ext cx="0" cy="0"/>
+          <a:chOff x="0" y="0"/>
+          <a:chExt cx="0" cy="0"/>
+        </a:xfrm>
+      </p:grpSpPr>
+      <p:sp>
+        <p:nvSpPr>
+          <p:cNvPr id="2" name="Slide Image Placeholder 1"/>
+          <p:cNvSpPr>
+            <a:spLocks noGrp="1" noRot="1" noChangeAspect="1"/>
+          </p:cNvSpPr>
+          <p:nvPr>
+            <p:ph type="sldImg"/>
+          </p:nvPr>
+        </p:nvSpPr>
+        <p:spPr/>
+      </p:sp>
+      <p:sp>
+        <p:nvSpPr>
+          <p:cNvPr id="3" name="Notes Placeholder 2"/>
+          <p:cNvSpPr>
+            <a:spLocks noGrp="1"/>
+          </p:cNvSpPr>
+          <p:nvPr>
+            <p:ph type="body" idx="1"/>
+          </p:nvPr>
+        </p:nvSpPr>
+        <p:spPr/>
+        <p:txBody>
+          <a:bodyPr/>
+          <a:lstStyle/>
+          <a:p>
+            <a:endParaRPr lang="en-US"/>
+          </a:p>
+          <a:p>
+            <a:r>
+              <a:rPr lang="en-US"/>
+              <a:t>----- Meeting Notes (12/3/15 16:42) -----</a:t>
+            </a:r>
+          </a:p>
+          <a:p>
+            <a:r>
+              <a:rPr lang="en-US"/>
+              <a:t>This is the (nameOfClass).</a:t>
+            </a:r>
+          </a:p>
+        </p:txBody>
+      </p:sp>
+      <p:sp>
+        <p:nvSpPr>
+          <p:cNvPr id="4" name="Slide Number Placeholder 3"/>
+          <p:cNvSpPr>
+            <a:spLocks noGrp="1"/>
+          </p:cNvSpPr>
+          <p:nvPr>
+            <p:ph type="sldNum" sz="quarter" idx="10"/>
+          </p:nvPr>
+        </p:nvSpPr>
+        <p:spPr/>
+        <p:txBody>
+          <a:bodyPr/>
+          <a:lstStyle/>
+          <a:p>
+            <a:fld id="{CA5D3BF3-D352-46FC-8343-31F56E6730EA}" type="slidenum">
+              <a:rPr lang="en-US" smtClean="0"/>
+              <a:pPr/>
+              <a:t>9</a:t>
+            </a:fld>
+            <a:endParaRPr lang="en-US"/>
+          </a:p>
+        </p:txBody>
+      </p:sp>
+    </p:spTree>
+    <p:extLst>
+      <p:ext uri="{BB962C8B-B14F-4D97-AF65-F5344CB8AC3E}">
+        <p14:creationId xmlns:p14="http://schemas.microsoft.com/office/powerpoint/2010/main" val="1382069506"/>
+      </p:ext>
+    </p:extLst>
   </p:cSld>
   <p:clrMapOvr>
     <a:masterClrMapping/>
@@ -4126,7 +5581,7 @@
       <p:sp>
         <p:nvSpPr>
           <p:cNvPr id="4" name="Action Button: Home 3">
-            <a:hlinkClick r:id="rId2" action="ppaction://hlinksldjump" highlightClick="1"/>
+            <a:hlinkClick r:id="rId3" action="ppaction://hlinksldjump" highlightClick="1"/>
           </p:cNvPr>
           <p:cNvSpPr/>
           <p:nvPr/>
@@ -4261,7 +5716,7 @@
       <p:sp>
         <p:nvSpPr>
           <p:cNvPr id="4" name="Action Button: Home 3">
-            <a:hlinkClick r:id="rId2" action="ppaction://hlinksldjump" highlightClick="1"/>
+            <a:hlinkClick r:id="rId3" action="ppaction://hlinksldjump" highlightClick="1"/>
           </p:cNvPr>
           <p:cNvSpPr/>
           <p:nvPr/>
@@ -4392,7 +5847,7 @@
       <p:sp>
         <p:nvSpPr>
           <p:cNvPr id="4" name="Action Button: Home 3">
-            <a:hlinkClick r:id="rId2" action="ppaction://hlinksldjump" highlightClick="1"/>
+            <a:hlinkClick r:id="rId3" action="ppaction://hlinksldjump" highlightClick="1"/>
           </p:cNvPr>
           <p:cNvSpPr/>
           <p:nvPr/>
@@ -4525,7 +5980,7 @@
       <p:sp>
         <p:nvSpPr>
           <p:cNvPr id="4" name="Action Button: Home 3">
-            <a:hlinkClick r:id="rId2" action="ppaction://hlinksldjump" highlightClick="1"/>
+            <a:hlinkClick r:id="rId3" action="ppaction://hlinksldjump" highlightClick="1"/>
           </p:cNvPr>
           <p:cNvSpPr/>
           <p:nvPr/>
@@ -4656,7 +6111,7 @@
       <p:sp>
         <p:nvSpPr>
           <p:cNvPr id="4" name="Action Button: Home 3">
-            <a:hlinkClick r:id="rId2" action="ppaction://hlinksldjump" highlightClick="1"/>
+            <a:hlinkClick r:id="rId3" action="ppaction://hlinksldjump" highlightClick="1"/>
           </p:cNvPr>
           <p:cNvSpPr/>
           <p:nvPr/>
@@ -4793,7 +6248,7 @@
       <p:sp>
         <p:nvSpPr>
           <p:cNvPr id="4" name="Action Button: Home 3">
-            <a:hlinkClick r:id="rId2" action="ppaction://hlinksldjump" highlightClick="1"/>
+            <a:hlinkClick r:id="rId3" action="ppaction://hlinksldjump" highlightClick="1"/>
           </p:cNvPr>
           <p:cNvSpPr/>
           <p:nvPr/>
@@ -4895,12 +6350,8 @@
           <a:lstStyle/>
           <a:p>
             <a:r>
-              <a:rPr lang="en-US" smtClean="0"/>
-              <a:t>Links </a:t>
-            </a:r>
-            <a:r>
               <a:rPr lang="en-US" dirty="0" smtClean="0"/>
-              <a:t>to Documents</a:t>
+              <a:t>Links to Documents</a:t>
             </a:r>
             <a:endParaRPr lang="en-US" dirty="0"/>
           </a:p>
@@ -4909,7 +6360,7 @@
       <p:sp>
         <p:nvSpPr>
           <p:cNvPr id="4" name="Action Button: Custom 3">
-            <a:hlinkClick r:id="rId2" action="ppaction://hlinkfile" highlightClick="1"/>
+            <a:hlinkClick r:id="rId3" action="ppaction://hlinkfile" highlightClick="1"/>
           </p:cNvPr>
           <p:cNvSpPr/>
           <p:nvPr/>
@@ -4961,7 +6412,7 @@
       <p:sp>
         <p:nvSpPr>
           <p:cNvPr id="5" name="Action Button: Document 4">
-            <a:hlinkClick r:id="rId3" action="ppaction://hlinkfile" highlightClick="1"/>
+            <a:hlinkClick r:id="rId4" action="ppaction://hlinkfile" highlightClick="1"/>
           </p:cNvPr>
           <p:cNvSpPr/>
           <p:nvPr/>
@@ -5013,7 +6464,7 @@
       <p:sp>
         <p:nvSpPr>
           <p:cNvPr id="6" name="Action Button: Document 5">
-            <a:hlinkClick r:id="rId4" action="ppaction://hlinkfile" highlightClick="1"/>
+            <a:hlinkClick r:id="rId5" action="ppaction://hlinkfile" highlightClick="1"/>
           </p:cNvPr>
           <p:cNvSpPr/>
           <p:nvPr/>
@@ -5065,7 +6516,7 @@
       <p:sp>
         <p:nvSpPr>
           <p:cNvPr id="7" name="Action Button: Document 6">
-            <a:hlinkClick r:id="rId5" action="ppaction://hlinkfile" highlightClick="1"/>
+            <a:hlinkClick r:id="rId6" action="ppaction://hlinkfile" highlightClick="1"/>
           </p:cNvPr>
           <p:cNvSpPr/>
           <p:nvPr/>
@@ -5112,7 +6563,7 @@
       <p:sp>
         <p:nvSpPr>
           <p:cNvPr id="8" name="Action Button: Document 7">
-            <a:hlinkClick r:id="rId6" action="ppaction://hlinkfile" highlightClick="1"/>
+            <a:hlinkClick r:id="rId7" action="ppaction://hlinkfile" highlightClick="1"/>
           </p:cNvPr>
           <p:cNvSpPr/>
           <p:nvPr/>
@@ -5159,7 +6610,7 @@
       <p:sp>
         <p:nvSpPr>
           <p:cNvPr id="9" name="Action Button: Document 8">
-            <a:hlinkClick r:id="rId7" action="ppaction://hlinkfile" highlightClick="1"/>
+            <a:hlinkClick r:id="rId8" action="ppaction://hlinkfile" highlightClick="1"/>
           </p:cNvPr>
           <p:cNvSpPr/>
           <p:nvPr/>
@@ -5206,7 +6657,7 @@
       <p:sp>
         <p:nvSpPr>
           <p:cNvPr id="10" name="Action Button: Document 9">
-            <a:hlinkClick r:id="rId8" action="ppaction://hlinkfile" highlightClick="1"/>
+            <a:hlinkClick r:id="rId9" action="ppaction://hlinkfile" highlightClick="1"/>
           </p:cNvPr>
           <p:cNvSpPr/>
           <p:nvPr/>
@@ -5260,6 +6711,25 @@
   <p:clrMapOvr>
     <a:masterClrMapping/>
   </p:clrMapOvr>
+  <mc:AlternateContent xmlns:mc="http://schemas.openxmlformats.org/markup-compatibility/2006">
+    <mc:Choice xmlns:p14="http://schemas.microsoft.com/office/powerpoint/2010/main" Requires="p14">
+      <p:transition spd="slow" p14:dur="800">
+        <p:dissolve/>
+      </p:transition>
+    </mc:Choice>
+    <mc:Fallback>
+      <p:transition xmlns:p14="http://schemas.microsoft.com/office/powerpoint/2010/main" spd="slow">
+        <p:dissolve/>
+      </p:transition>
+    </mc:Fallback>
+  </mc:AlternateContent>
+  <p:timing>
+    <p:tnLst>
+      <p:par>
+        <p:cTn xmlns:p14="http://schemas.microsoft.com/office/powerpoint/2010/main" id="1" dur="indefinite" restart="never" nodeType="tmRoot"/>
+      </p:par>
+    </p:tnLst>
+  </p:timing>
 </p:sld>
 </file>
 
@@ -5289,7 +6759,7 @@
           <p:nvPr/>
         </p:nvPicPr>
         <p:blipFill>
-          <a:blip r:embed="rId2">
+          <a:blip r:embed="rId3">
             <a:extLst>
               <a:ext uri="{28A0092B-C50C-407E-A947-70E740481C1C}">
                 <a14:useLocalDpi xmlns:a14="http://schemas.microsoft.com/office/drawing/2010/main" val="0"/>
@@ -6019,7 +7489,7 @@
       <p:sp>
         <p:nvSpPr>
           <p:cNvPr id="4" name="Action Button: Custom 3">
-            <a:hlinkClick r:id="rId3" action="ppaction://hlinksldjump" highlightClick="1"/>
+            <a:hlinkClick r:id="rId4" action="ppaction://hlinksldjump" highlightClick="1"/>
           </p:cNvPr>
           <p:cNvSpPr/>
           <p:nvPr/>
@@ -6059,7 +7529,7 @@
       <p:sp>
         <p:nvSpPr>
           <p:cNvPr id="7" name="Action Button: Custom 6">
-            <a:hlinkClick r:id="rId4" action="ppaction://hlinksldjump" highlightClick="1"/>
+            <a:hlinkClick r:id="rId5" action="ppaction://hlinksldjump" highlightClick="1"/>
           </p:cNvPr>
           <p:cNvSpPr/>
           <p:nvPr/>
@@ -6099,7 +7569,7 @@
       <p:sp>
         <p:nvSpPr>
           <p:cNvPr id="8" name="Action Button: Custom 7">
-            <a:hlinkClick r:id="rId5" action="ppaction://hlinksldjump" highlightClick="1"/>
+            <a:hlinkClick r:id="rId6" action="ppaction://hlinksldjump" highlightClick="1"/>
           </p:cNvPr>
           <p:cNvSpPr/>
           <p:nvPr/>
@@ -6139,7 +7609,7 @@
       <p:sp>
         <p:nvSpPr>
           <p:cNvPr id="9" name="Action Button: Custom 8">
-            <a:hlinkClick r:id="rId6" action="ppaction://hlinksldjump" highlightClick="1"/>
+            <a:hlinkClick r:id="rId7" action="ppaction://hlinksldjump" highlightClick="1"/>
           </p:cNvPr>
           <p:cNvSpPr/>
           <p:nvPr/>
@@ -6179,7 +7649,7 @@
       <p:sp>
         <p:nvSpPr>
           <p:cNvPr id="10" name="Action Button: Custom 9">
-            <a:hlinkClick r:id="rId7" action="ppaction://hlinksldjump" highlightClick="1"/>
+            <a:hlinkClick r:id="rId8" action="ppaction://hlinksldjump" highlightClick="1"/>
           </p:cNvPr>
           <p:cNvSpPr/>
           <p:nvPr/>
@@ -6219,7 +7689,7 @@
       <p:sp>
         <p:nvSpPr>
           <p:cNvPr id="11" name="Action Button: Custom 10">
-            <a:hlinkClick r:id="rId8" action="ppaction://hlinksldjump" highlightClick="1"/>
+            <a:hlinkClick r:id="rId9" action="ppaction://hlinksldjump" highlightClick="1"/>
           </p:cNvPr>
           <p:cNvSpPr/>
           <p:nvPr/>
@@ -6259,7 +7729,7 @@
       <p:sp>
         <p:nvSpPr>
           <p:cNvPr id="12" name="Action Button: Custom 11">
-            <a:hlinkClick r:id="rId7" action="ppaction://hlinksldjump" highlightClick="1"/>
+            <a:hlinkClick r:id="rId8" action="ppaction://hlinksldjump" highlightClick="1"/>
           </p:cNvPr>
           <p:cNvSpPr/>
           <p:nvPr/>
@@ -6299,7 +7769,7 @@
       <p:sp>
         <p:nvSpPr>
           <p:cNvPr id="13" name="Action Button: Custom 12">
-            <a:hlinkClick r:id="rId9" action="ppaction://hlinksldjump" highlightClick="1"/>
+            <a:hlinkClick r:id="rId10" action="ppaction://hlinksldjump" highlightClick="1"/>
           </p:cNvPr>
           <p:cNvSpPr/>
           <p:nvPr/>
@@ -6339,7 +7809,7 @@
       <p:sp>
         <p:nvSpPr>
           <p:cNvPr id="14" name="Action Button: Custom 13">
-            <a:hlinkClick r:id="rId10" action="ppaction://hlinksldjump" highlightClick="1"/>
+            <a:hlinkClick r:id="rId11" action="ppaction://hlinksldjump" highlightClick="1"/>
           </p:cNvPr>
           <p:cNvSpPr/>
           <p:nvPr/>
@@ -6379,7 +7849,7 @@
       <p:sp>
         <p:nvSpPr>
           <p:cNvPr id="15" name="Action Button: Custom 14">
-            <a:hlinkClick r:id="rId11" action="ppaction://hlinksldjump" highlightClick="1"/>
+            <a:hlinkClick r:id="rId12" action="ppaction://hlinksldjump" highlightClick="1"/>
           </p:cNvPr>
           <p:cNvSpPr/>
           <p:nvPr/>
@@ -6419,7 +7889,7 @@
       <p:sp>
         <p:nvSpPr>
           <p:cNvPr id="16" name="Action Button: Custom 15">
-            <a:hlinkClick r:id="rId12" action="ppaction://hlinksldjump" highlightClick="1"/>
+            <a:hlinkClick r:id="rId13" action="ppaction://hlinksldjump" highlightClick="1"/>
           </p:cNvPr>
           <p:cNvSpPr/>
           <p:nvPr/>
@@ -6459,7 +7929,7 @@
       <p:sp>
         <p:nvSpPr>
           <p:cNvPr id="17" name="Action Button: Custom 16">
-            <a:hlinkClick r:id="rId13" action="ppaction://hlinksldjump" highlightClick="1"/>
+            <a:hlinkClick r:id="rId14" action="ppaction://hlinksldjump" highlightClick="1"/>
           </p:cNvPr>
           <p:cNvSpPr/>
           <p:nvPr/>
@@ -6499,7 +7969,7 @@
       <p:sp>
         <p:nvSpPr>
           <p:cNvPr id="18" name="Action Button: Custom 17">
-            <a:hlinkClick r:id="rId14" action="ppaction://hlinksldjump" highlightClick="1"/>
+            <a:hlinkClick r:id="rId15" action="ppaction://hlinksldjump" highlightClick="1"/>
           </p:cNvPr>
           <p:cNvSpPr/>
           <p:nvPr/>
@@ -6539,7 +8009,7 @@
       <p:sp>
         <p:nvSpPr>
           <p:cNvPr id="20" name="Action Button: Custom 19">
-            <a:hlinkClick r:id="rId15" action="ppaction://hlinksldjump" highlightClick="1"/>
+            <a:hlinkClick r:id="rId16" action="ppaction://hlinksldjump" highlightClick="1"/>
           </p:cNvPr>
           <p:cNvSpPr/>
           <p:nvPr/>
@@ -6766,7 +8236,7 @@
       <p:sp>
         <p:nvSpPr>
           <p:cNvPr id="4" name="Action Button: Home 3">
-            <a:hlinkClick r:id="rId2" action="ppaction://hlinksldjump" highlightClick="1"/>
+            <a:hlinkClick r:id="rId3" action="ppaction://hlinksldjump" highlightClick="1"/>
           </p:cNvPr>
           <p:cNvSpPr/>
           <p:nvPr/>
@@ -7274,7 +8744,7 @@
       <p:sp>
         <p:nvSpPr>
           <p:cNvPr id="4" name="Action Button: Home 3">
-            <a:hlinkClick r:id="rId2" action="ppaction://hlinksldjump" highlightClick="1"/>
+            <a:hlinkClick r:id="rId3" action="ppaction://hlinksldjump" highlightClick="1"/>
           </p:cNvPr>
           <p:cNvSpPr/>
           <p:nvPr/>
@@ -7787,7 +9257,7 @@
       <p:sp>
         <p:nvSpPr>
           <p:cNvPr id="4" name="Action Button: Home 3">
-            <a:hlinkClick r:id="rId2" action="ppaction://hlinksldjump" highlightClick="1"/>
+            <a:hlinkClick r:id="rId3" action="ppaction://hlinksldjump" highlightClick="1"/>
           </p:cNvPr>
           <p:cNvSpPr/>
           <p:nvPr/>
@@ -8196,7 +9666,7 @@
       <p:sp>
         <p:nvSpPr>
           <p:cNvPr id="4" name="Action Button: Home 3">
-            <a:hlinkClick r:id="rId2" action="ppaction://hlinksldjump" highlightClick="1"/>
+            <a:hlinkClick r:id="rId3" action="ppaction://hlinksldjump" highlightClick="1"/>
           </p:cNvPr>
           <p:cNvSpPr/>
           <p:nvPr/>
@@ -8306,7 +9776,7 @@
       <p:sp>
         <p:nvSpPr>
           <p:cNvPr id="4" name="Action Button: Custom 3">
-            <a:hlinkClick r:id="rId2" action="ppaction://hlinksldjump" highlightClick="1"/>
+            <a:hlinkClick r:id="rId3" action="ppaction://hlinksldjump" highlightClick="1"/>
           </p:cNvPr>
           <p:cNvSpPr/>
           <p:nvPr/>
@@ -8358,7 +9828,7 @@
       <p:sp>
         <p:nvSpPr>
           <p:cNvPr id="5" name="Action Button: Custom 4">
-            <a:hlinkClick r:id="rId3" action="ppaction://hlinksldjump" highlightClick="1"/>
+            <a:hlinkClick r:id="rId4" action="ppaction://hlinksldjump" highlightClick="1"/>
           </p:cNvPr>
           <p:cNvSpPr/>
           <p:nvPr/>
@@ -8410,7 +9880,7 @@
       <p:sp>
         <p:nvSpPr>
           <p:cNvPr id="6" name="Action Button: Home 5">
-            <a:hlinkClick r:id="rId4" action="ppaction://hlinksldjump" highlightClick="1"/>
+            <a:hlinkClick r:id="rId5" action="ppaction://hlinksldjump" highlightClick="1"/>
           </p:cNvPr>
           <p:cNvSpPr/>
           <p:nvPr/>
@@ -8551,7 +10021,7 @@
       <p:sp>
         <p:nvSpPr>
           <p:cNvPr id="4" name="Action Button: Custom 3">
-            <a:hlinkClick r:id="rId2" action="ppaction://hlinksldjump" highlightClick="1"/>
+            <a:hlinkClick r:id="rId3" action="ppaction://hlinksldjump" highlightClick="1"/>
           </p:cNvPr>
           <p:cNvSpPr/>
           <p:nvPr/>
@@ -8603,7 +10073,7 @@
       <p:sp>
         <p:nvSpPr>
           <p:cNvPr id="5" name="Action Button: Home 4">
-            <a:hlinkClick r:id="rId3" action="ppaction://hlinksldjump" highlightClick="1"/>
+            <a:hlinkClick r:id="rId4" action="ppaction://hlinksldjump" highlightClick="1"/>
           </p:cNvPr>
           <p:cNvSpPr/>
           <p:nvPr/>
@@ -8744,7 +10214,7 @@
       <p:sp>
         <p:nvSpPr>
           <p:cNvPr id="4" name="Action Button: Custom 3">
-            <a:hlinkClick r:id="rId2" action="ppaction://hlinksldjump" highlightClick="1"/>
+            <a:hlinkClick r:id="rId3" action="ppaction://hlinksldjump" highlightClick="1"/>
           </p:cNvPr>
           <p:cNvSpPr/>
           <p:nvPr/>
@@ -8796,7 +10266,7 @@
       <p:sp>
         <p:nvSpPr>
           <p:cNvPr id="5" name="Action Button: Home 4">
-            <a:hlinkClick r:id="rId3" action="ppaction://hlinksldjump" highlightClick="1"/>
+            <a:hlinkClick r:id="rId4" action="ppaction://hlinksldjump" highlightClick="1"/>
           </p:cNvPr>
           <p:cNvSpPr/>
           <p:nvPr/>

</xml_diff>